<commit_message>
Configuracion de Kafka + PostgreSQL
</commit_message>
<xml_diff>
--- a/docs/Tassa d’inflació en latència horària_Presentación.pptx
+++ b/docs/Tassa d’inflació en latència horària_Presentación.pptx
@@ -6,7 +6,7 @@
     <p:sldMasterId id="2147483660" r:id="rId2"/>
   </p:sldMasterIdLst>
   <p:notesMasterIdLst>
-    <p:notesMasterId r:id="rId9"/>
+    <p:notesMasterId r:id="rId10"/>
   </p:notesMasterIdLst>
   <p:sldIdLst>
     <p:sldId id="256" r:id="rId3"/>
@@ -14,7 +14,8 @@
     <p:sldId id="265" r:id="rId5"/>
     <p:sldId id="267" r:id="rId6"/>
     <p:sldId id="262" r:id="rId7"/>
-    <p:sldId id="261" r:id="rId8"/>
+    <p:sldId id="268" r:id="rId8"/>
+    <p:sldId id="261" r:id="rId9"/>
   </p:sldIdLst>
   <p:sldSz cx="12192000" cy="6858000"/>
   <p:notesSz cx="6858000" cy="9144000"/>
@@ -3993,7 +3994,7 @@
           <a:p>
             <a:fld id="{BDDBADEE-7FB1-49C0-B245-1FAEEE1BEF6B}" type="datetimeFigureOut">
               <a:rPr lang="ca-ES" smtClean="0"/>
-              <a:t>26/7/2025</a:t>
+              <a:t>1/8/2025</a:t>
             </a:fld>
             <a:endParaRPr lang="ca-ES"/>
           </a:p>
@@ -4429,6 +4430,114 @@
 </p:notes>
 </file>
 
+<file path=ppt/notesSlides/notesSlide3.xml><?xml version="1.0" encoding="utf-8"?>
+<p:notes xmlns:a="http://schemas.openxmlformats.org/drawingml/2006/main" xmlns:r="http://schemas.openxmlformats.org/officeDocument/2006/relationships" xmlns:p="http://schemas.openxmlformats.org/presentationml/2006/main">
+  <p:cSld>
+    <p:spTree>
+      <p:nvGrpSpPr>
+        <p:cNvPr id="1" name="">
+          <a:extLst>
+            <a:ext uri="{FF2B5EF4-FFF2-40B4-BE49-F238E27FC236}">
+              <a16:creationId xmlns:a16="http://schemas.microsoft.com/office/drawing/2014/main" id="{42D27C58-709B-DA10-79C7-65798A4750E9}"/>
+            </a:ext>
+          </a:extLst>
+        </p:cNvPr>
+        <p:cNvGrpSpPr/>
+        <p:nvPr/>
+      </p:nvGrpSpPr>
+      <p:grpSpPr>
+        <a:xfrm>
+          <a:off x="0" y="0"/>
+          <a:ext cx="0" cy="0"/>
+          <a:chOff x="0" y="0"/>
+          <a:chExt cx="0" cy="0"/>
+        </a:xfrm>
+      </p:grpSpPr>
+      <p:sp>
+        <p:nvSpPr>
+          <p:cNvPr id="2" name="Marcador de imagen de diapositiva 1">
+            <a:extLst>
+              <a:ext uri="{FF2B5EF4-FFF2-40B4-BE49-F238E27FC236}">
+                <a16:creationId xmlns:a16="http://schemas.microsoft.com/office/drawing/2014/main" id="{DB230808-2C1B-4FAB-CEC2-280EC13115BF}"/>
+              </a:ext>
+            </a:extLst>
+          </p:cNvPr>
+          <p:cNvSpPr>
+            <a:spLocks noGrp="1" noRot="1" noChangeAspect="1"/>
+          </p:cNvSpPr>
+          <p:nvPr>
+            <p:ph type="sldImg"/>
+          </p:nvPr>
+        </p:nvSpPr>
+        <p:spPr/>
+      </p:sp>
+      <p:sp>
+        <p:nvSpPr>
+          <p:cNvPr id="3" name="Marcador de notas 2">
+            <a:extLst>
+              <a:ext uri="{FF2B5EF4-FFF2-40B4-BE49-F238E27FC236}">
+                <a16:creationId xmlns:a16="http://schemas.microsoft.com/office/drawing/2014/main" id="{2BCB0D1E-BB20-845E-043D-6AF6CD6BC2E8}"/>
+              </a:ext>
+            </a:extLst>
+          </p:cNvPr>
+          <p:cNvSpPr>
+            <a:spLocks noGrp="1"/>
+          </p:cNvSpPr>
+          <p:nvPr>
+            <p:ph type="body" idx="1"/>
+          </p:nvPr>
+        </p:nvSpPr>
+        <p:spPr/>
+        <p:txBody>
+          <a:bodyPr/>
+          <a:lstStyle/>
+          <a:p>
+            <a:endParaRPr lang="ca-ES" dirty="0"/>
+          </a:p>
+        </p:txBody>
+      </p:sp>
+      <p:sp>
+        <p:nvSpPr>
+          <p:cNvPr id="4" name="Marcador de número de diapositiva 3">
+            <a:extLst>
+              <a:ext uri="{FF2B5EF4-FFF2-40B4-BE49-F238E27FC236}">
+                <a16:creationId xmlns:a16="http://schemas.microsoft.com/office/drawing/2014/main" id="{D9826D37-BBCD-16DB-CCC8-00E17E03D4D3}"/>
+              </a:ext>
+            </a:extLst>
+          </p:cNvPr>
+          <p:cNvSpPr>
+            <a:spLocks noGrp="1"/>
+          </p:cNvSpPr>
+          <p:nvPr>
+            <p:ph type="sldNum" sz="quarter" idx="5"/>
+          </p:nvPr>
+        </p:nvSpPr>
+        <p:spPr/>
+        <p:txBody>
+          <a:bodyPr/>
+          <a:lstStyle/>
+          <a:p>
+            <a:fld id="{F38564BB-C42A-42DE-AB8A-5CB12996A0CB}" type="slidenum">
+              <a:rPr lang="ca-ES" smtClean="0"/>
+              <a:t>6</a:t>
+            </a:fld>
+            <a:endParaRPr lang="ca-ES"/>
+          </a:p>
+        </p:txBody>
+      </p:sp>
+    </p:spTree>
+    <p:extLst>
+      <p:ext uri="{BB962C8B-B14F-4D97-AF65-F5344CB8AC3E}">
+        <p14:creationId xmlns:p14="http://schemas.microsoft.com/office/powerpoint/2010/main" val="4182857681"/>
+      </p:ext>
+    </p:extLst>
+  </p:cSld>
+  <p:clrMapOvr>
+    <a:masterClrMapping/>
+  </p:clrMapOvr>
+</p:notes>
+</file>
+
 <file path=ppt/slideLayouts/slideLayout1.xml><?xml version="1.0" encoding="utf-8"?>
 <p:sldLayout xmlns:a="http://schemas.openxmlformats.org/drawingml/2006/main" xmlns:r="http://schemas.openxmlformats.org/officeDocument/2006/relationships" xmlns:p="http://schemas.openxmlformats.org/presentationml/2006/main" type="title" preserve="1">
   <p:cSld name="Diapositiva de título">
@@ -4576,7 +4685,7 @@
           <a:p>
             <a:fld id="{713BEE5D-B36A-49E3-9491-E01FEA3E4F48}" type="datetimeFigureOut">
               <a:rPr lang="es-ES" smtClean="0"/>
-              <a:t>26/07/2025</a:t>
+              <a:t>01/08/2025</a:t>
             </a:fld>
             <a:endParaRPr lang="es-ES"/>
           </a:p>
@@ -4774,7 +4883,7 @@
           <a:p>
             <a:fld id="{713BEE5D-B36A-49E3-9491-E01FEA3E4F48}" type="datetimeFigureOut">
               <a:rPr lang="es-ES" smtClean="0"/>
-              <a:t>26/07/2025</a:t>
+              <a:t>01/08/2025</a:t>
             </a:fld>
             <a:endParaRPr lang="es-ES"/>
           </a:p>
@@ -4982,7 +5091,7 @@
           <a:p>
             <a:fld id="{713BEE5D-B36A-49E3-9491-E01FEA3E4F48}" type="datetimeFigureOut">
               <a:rPr lang="es-ES" smtClean="0"/>
-              <a:t>26/07/2025</a:t>
+              <a:t>01/08/2025</a:t>
             </a:fld>
             <a:endParaRPr lang="es-ES"/>
           </a:p>
@@ -5204,7 +5313,7 @@
           <a:p>
             <a:fld id="{6C2B88AF-F851-489D-837D-3DE516769CF3}" type="datetimeFigureOut">
               <a:rPr lang="ca-ES" smtClean="0"/>
-              <a:t>26/7/2025</a:t>
+              <a:t>1/8/2025</a:t>
             </a:fld>
             <a:endParaRPr lang="ca-ES"/>
           </a:p>
@@ -5404,7 +5513,7 @@
           <a:p>
             <a:fld id="{6C2B88AF-F851-489D-837D-3DE516769CF3}" type="datetimeFigureOut">
               <a:rPr lang="ca-ES" smtClean="0"/>
-              <a:t>26/7/2025</a:t>
+              <a:t>1/8/2025</a:t>
             </a:fld>
             <a:endParaRPr lang="ca-ES"/>
           </a:p>
@@ -5680,7 +5789,7 @@
           <a:p>
             <a:fld id="{6C2B88AF-F851-489D-837D-3DE516769CF3}" type="datetimeFigureOut">
               <a:rPr lang="ca-ES" smtClean="0"/>
-              <a:t>26/7/2025</a:t>
+              <a:t>1/8/2025</a:t>
             </a:fld>
             <a:endParaRPr lang="ca-ES"/>
           </a:p>
@@ -5948,7 +6057,7 @@
           <a:p>
             <a:fld id="{6C2B88AF-F851-489D-837D-3DE516769CF3}" type="datetimeFigureOut">
               <a:rPr lang="ca-ES" smtClean="0"/>
-              <a:t>26/7/2025</a:t>
+              <a:t>1/8/2025</a:t>
             </a:fld>
             <a:endParaRPr lang="ca-ES"/>
           </a:p>
@@ -6363,7 +6472,7 @@
           <a:p>
             <a:fld id="{6C2B88AF-F851-489D-837D-3DE516769CF3}" type="datetimeFigureOut">
               <a:rPr lang="ca-ES" smtClean="0"/>
-              <a:t>26/7/2025</a:t>
+              <a:t>1/8/2025</a:t>
             </a:fld>
             <a:endParaRPr lang="ca-ES"/>
           </a:p>
@@ -6505,7 +6614,7 @@
           <a:p>
             <a:fld id="{6C2B88AF-F851-489D-837D-3DE516769CF3}" type="datetimeFigureOut">
               <a:rPr lang="ca-ES" smtClean="0"/>
-              <a:t>26/7/2025</a:t>
+              <a:t>1/8/2025</a:t>
             </a:fld>
             <a:endParaRPr lang="ca-ES"/>
           </a:p>
@@ -6618,7 +6727,7 @@
           <a:p>
             <a:fld id="{6C2B88AF-F851-489D-837D-3DE516769CF3}" type="datetimeFigureOut">
               <a:rPr lang="ca-ES" smtClean="0"/>
-              <a:t>26/7/2025</a:t>
+              <a:t>1/8/2025</a:t>
             </a:fld>
             <a:endParaRPr lang="ca-ES"/>
           </a:p>
@@ -6931,7 +7040,7 @@
           <a:p>
             <a:fld id="{6C2B88AF-F851-489D-837D-3DE516769CF3}" type="datetimeFigureOut">
               <a:rPr lang="ca-ES" smtClean="0"/>
-              <a:t>26/7/2025</a:t>
+              <a:t>1/8/2025</a:t>
             </a:fld>
             <a:endParaRPr lang="ca-ES"/>
           </a:p>
@@ -7129,7 +7238,7 @@
           <a:p>
             <a:fld id="{713BEE5D-B36A-49E3-9491-E01FEA3E4F48}" type="datetimeFigureOut">
               <a:rPr lang="es-ES" smtClean="0"/>
-              <a:t>26/07/2025</a:t>
+              <a:t>01/08/2025</a:t>
             </a:fld>
             <a:endParaRPr lang="es-ES"/>
           </a:p>
@@ -7418,7 +7527,7 @@
           <a:p>
             <a:fld id="{6C2B88AF-F851-489D-837D-3DE516769CF3}" type="datetimeFigureOut">
               <a:rPr lang="ca-ES" smtClean="0"/>
-              <a:t>26/7/2025</a:t>
+              <a:t>1/8/2025</a:t>
             </a:fld>
             <a:endParaRPr lang="ca-ES"/>
           </a:p>
@@ -7618,7 +7727,7 @@
           <a:p>
             <a:fld id="{6C2B88AF-F851-489D-837D-3DE516769CF3}" type="datetimeFigureOut">
               <a:rPr lang="ca-ES" smtClean="0"/>
-              <a:t>26/7/2025</a:t>
+              <a:t>1/8/2025</a:t>
             </a:fld>
             <a:endParaRPr lang="ca-ES"/>
           </a:p>
@@ -7828,7 +7937,7 @@
           <a:p>
             <a:fld id="{6C2B88AF-F851-489D-837D-3DE516769CF3}" type="datetimeFigureOut">
               <a:rPr lang="ca-ES" smtClean="0"/>
-              <a:t>26/7/2025</a:t>
+              <a:t>1/8/2025</a:t>
             </a:fld>
             <a:endParaRPr lang="ca-ES"/>
           </a:p>
@@ -8103,7 +8212,7 @@
           <a:p>
             <a:fld id="{713BEE5D-B36A-49E3-9491-E01FEA3E4F48}" type="datetimeFigureOut">
               <a:rPr lang="es-ES" smtClean="0"/>
-              <a:t>26/07/2025</a:t>
+              <a:t>01/08/2025</a:t>
             </a:fld>
             <a:endParaRPr lang="es-ES"/>
           </a:p>
@@ -8368,7 +8477,7 @@
           <a:p>
             <a:fld id="{713BEE5D-B36A-49E3-9491-E01FEA3E4F48}" type="datetimeFigureOut">
               <a:rPr lang="es-ES" smtClean="0"/>
-              <a:t>26/07/2025</a:t>
+              <a:t>01/08/2025</a:t>
             </a:fld>
             <a:endParaRPr lang="es-ES"/>
           </a:p>
@@ -8780,7 +8889,7 @@
           <a:p>
             <a:fld id="{713BEE5D-B36A-49E3-9491-E01FEA3E4F48}" type="datetimeFigureOut">
               <a:rPr lang="es-ES" smtClean="0"/>
-              <a:t>26/07/2025</a:t>
+              <a:t>01/08/2025</a:t>
             </a:fld>
             <a:endParaRPr lang="es-ES"/>
           </a:p>
@@ -8921,7 +9030,7 @@
           <a:p>
             <a:fld id="{713BEE5D-B36A-49E3-9491-E01FEA3E4F48}" type="datetimeFigureOut">
               <a:rPr lang="es-ES" smtClean="0"/>
-              <a:t>26/07/2025</a:t>
+              <a:t>01/08/2025</a:t>
             </a:fld>
             <a:endParaRPr lang="es-ES"/>
           </a:p>
@@ -9034,7 +9143,7 @@
           <a:p>
             <a:fld id="{713BEE5D-B36A-49E3-9491-E01FEA3E4F48}" type="datetimeFigureOut">
               <a:rPr lang="es-ES" smtClean="0"/>
-              <a:t>26/07/2025</a:t>
+              <a:t>01/08/2025</a:t>
             </a:fld>
             <a:endParaRPr lang="es-ES"/>
           </a:p>
@@ -9345,7 +9454,7 @@
           <a:p>
             <a:fld id="{713BEE5D-B36A-49E3-9491-E01FEA3E4F48}" type="datetimeFigureOut">
               <a:rPr lang="es-ES" smtClean="0"/>
-              <a:t>26/07/2025</a:t>
+              <a:t>01/08/2025</a:t>
             </a:fld>
             <a:endParaRPr lang="es-ES"/>
           </a:p>
@@ -9633,7 +9742,7 @@
           <a:p>
             <a:fld id="{713BEE5D-B36A-49E3-9491-E01FEA3E4F48}" type="datetimeFigureOut">
               <a:rPr lang="es-ES" smtClean="0"/>
-              <a:t>26/07/2025</a:t>
+              <a:t>01/08/2025</a:t>
             </a:fld>
             <a:endParaRPr lang="es-ES"/>
           </a:p>
@@ -9874,7 +9983,7 @@
           <a:p>
             <a:fld id="{713BEE5D-B36A-49E3-9491-E01FEA3E4F48}" type="datetimeFigureOut">
               <a:rPr lang="es-ES" smtClean="0"/>
-              <a:t>26/07/2025</a:t>
+              <a:t>01/08/2025</a:t>
             </a:fld>
             <a:endParaRPr lang="es-ES"/>
           </a:p>
@@ -10444,7 +10553,7 @@
           <a:p>
             <a:fld id="{6C2B88AF-F851-489D-837D-3DE516769CF3}" type="datetimeFigureOut">
               <a:rPr lang="ca-ES" smtClean="0"/>
-              <a:t>26/7/2025</a:t>
+              <a:t>1/8/2025</a:t>
             </a:fld>
             <a:endParaRPr lang="ca-ES"/>
           </a:p>
@@ -16311,6 +16420,51 @@
           </a:prstGeom>
         </p:spPr>
       </p:pic>
+      <p:sp>
+        <p:nvSpPr>
+          <p:cNvPr id="14" name="CuadroTexto 13">
+            <a:extLst>
+              <a:ext uri="{FF2B5EF4-FFF2-40B4-BE49-F238E27FC236}">
+                <a16:creationId xmlns:a16="http://schemas.microsoft.com/office/drawing/2014/main" id="{573BFA12-64A9-F7DB-19C7-7F0EA454EA65}"/>
+              </a:ext>
+            </a:extLst>
+          </p:cNvPr>
+          <p:cNvSpPr txBox="1"/>
+          <p:nvPr/>
+        </p:nvSpPr>
+        <p:spPr>
+          <a:xfrm>
+            <a:off x="222178" y="6464175"/>
+            <a:ext cx="9932888" cy="246221"/>
+          </a:xfrm>
+          <a:prstGeom prst="rect">
+            <a:avLst/>
+          </a:prstGeom>
+          <a:noFill/>
+          <a:ln>
+            <a:solidFill>
+              <a:schemeClr val="tx2"/>
+            </a:solidFill>
+          </a:ln>
+        </p:spPr>
+        <p:txBody>
+          <a:bodyPr wrap="square" rtlCol="0">
+            <a:spAutoFit/>
+          </a:bodyPr>
+          <a:lstStyle/>
+          <a:p>
+            <a:r>
+              <a:rPr lang="ca-ES" sz="1000" dirty="0">
+                <a:latin typeface="+mj-lt"/>
+              </a:rPr>
+              <a:t>https://learn.microsoft.com/en-us/azure/architecture/databases/guide/big-data-architectures</a:t>
+            </a:r>
+            <a:endParaRPr lang="ca-ES" sz="1000" noProof="0" dirty="0">
+              <a:latin typeface="+mj-lt"/>
+            </a:endParaRPr>
+          </a:p>
+        </p:txBody>
+      </p:sp>
     </p:spTree>
     <p:extLst>
       <p:ext uri="{BB962C8B-B14F-4D97-AF65-F5344CB8AC3E}">
@@ -16325,6 +16479,2338 @@
 </file>
 
 <file path=ppt/slides/slide6.xml><?xml version="1.0" encoding="utf-8"?>
+<p:sld xmlns:a="http://schemas.openxmlformats.org/drawingml/2006/main" xmlns:r="http://schemas.openxmlformats.org/officeDocument/2006/relationships" xmlns:p="http://schemas.openxmlformats.org/presentationml/2006/main">
+  <p:cSld>
+    <p:spTree>
+      <p:nvGrpSpPr>
+        <p:cNvPr id="1" name="">
+          <a:extLst>
+            <a:ext uri="{FF2B5EF4-FFF2-40B4-BE49-F238E27FC236}">
+              <a16:creationId xmlns:a16="http://schemas.microsoft.com/office/drawing/2014/main" id="{66EF2FE8-7747-A93C-390A-5B8F68AB54AE}"/>
+            </a:ext>
+          </a:extLst>
+        </p:cNvPr>
+        <p:cNvGrpSpPr/>
+        <p:nvPr/>
+      </p:nvGrpSpPr>
+      <p:grpSpPr>
+        <a:xfrm>
+          <a:off x="0" y="0"/>
+          <a:ext cx="0" cy="0"/>
+          <a:chOff x="0" y="0"/>
+          <a:chExt cx="0" cy="0"/>
+        </a:xfrm>
+      </p:grpSpPr>
+      <p:sp>
+        <p:nvSpPr>
+          <p:cNvPr id="26" name="Rectángulo: esquinas redondeadas 25">
+            <a:extLst>
+              <a:ext uri="{FF2B5EF4-FFF2-40B4-BE49-F238E27FC236}">
+                <a16:creationId xmlns:a16="http://schemas.microsoft.com/office/drawing/2014/main" id="{019D3908-B029-63F5-B377-1A9D1DB58700}"/>
+              </a:ext>
+            </a:extLst>
+          </p:cNvPr>
+          <p:cNvSpPr/>
+          <p:nvPr/>
+        </p:nvSpPr>
+        <p:spPr>
+          <a:xfrm>
+            <a:off x="191607" y="5829765"/>
+            <a:ext cx="11546151" cy="727101"/>
+          </a:xfrm>
+          <a:prstGeom prst="roundRect">
+            <a:avLst/>
+          </a:prstGeom>
+          <a:solidFill>
+            <a:schemeClr val="bg1">
+              <a:lumMod val="85000"/>
+            </a:schemeClr>
+          </a:solidFill>
+          <a:ln>
+            <a:solidFill>
+              <a:schemeClr val="bg1">
+                <a:lumMod val="85000"/>
+              </a:schemeClr>
+            </a:solidFill>
+          </a:ln>
+        </p:spPr>
+        <p:style>
+          <a:lnRef idx="2">
+            <a:schemeClr val="accent1">
+              <a:shade val="15000"/>
+            </a:schemeClr>
+          </a:lnRef>
+          <a:fillRef idx="1">
+            <a:schemeClr val="accent1"/>
+          </a:fillRef>
+          <a:effectRef idx="0">
+            <a:schemeClr val="accent1"/>
+          </a:effectRef>
+          <a:fontRef idx="minor">
+            <a:schemeClr val="lt1"/>
+          </a:fontRef>
+        </p:style>
+        <p:txBody>
+          <a:bodyPr rtlCol="0" anchor="ctr"/>
+          <a:lstStyle/>
+          <a:p>
+            <a:pPr algn="ctr"/>
+            <a:endParaRPr lang="ca-ES" noProof="0" dirty="0"/>
+          </a:p>
+        </p:txBody>
+      </p:sp>
+      <p:sp>
+        <p:nvSpPr>
+          <p:cNvPr id="2" name="Título 1">
+            <a:extLst>
+              <a:ext uri="{FF2B5EF4-FFF2-40B4-BE49-F238E27FC236}">
+                <a16:creationId xmlns:a16="http://schemas.microsoft.com/office/drawing/2014/main" id="{3571310E-BE05-9B6A-39D9-723859D82318}"/>
+              </a:ext>
+            </a:extLst>
+          </p:cNvPr>
+          <p:cNvSpPr>
+            <a:spLocks noGrp="1"/>
+          </p:cNvSpPr>
+          <p:nvPr>
+            <p:ph type="title"/>
+          </p:nvPr>
+        </p:nvSpPr>
+        <p:spPr>
+          <a:xfrm>
+            <a:off x="222178" y="16411"/>
+            <a:ext cx="11061518" cy="1179576"/>
+          </a:xfrm>
+        </p:spPr>
+        <p:txBody>
+          <a:bodyPr>
+            <a:normAutofit/>
+          </a:bodyPr>
+          <a:lstStyle/>
+          <a:p>
+            <a:r>
+              <a:rPr lang="ca-ES" sz="4000" b="1" noProof="0" dirty="0"/>
+              <a:t>Arquitectura</a:t>
+            </a:r>
+            <a:endParaRPr lang="ca-ES" sz="4000" noProof="0" dirty="0"/>
+          </a:p>
+        </p:txBody>
+      </p:sp>
+      <p:sp>
+        <p:nvSpPr>
+          <p:cNvPr id="27" name="Rectángulo: esquinas redondeadas 26">
+            <a:extLst>
+              <a:ext uri="{FF2B5EF4-FFF2-40B4-BE49-F238E27FC236}">
+                <a16:creationId xmlns:a16="http://schemas.microsoft.com/office/drawing/2014/main" id="{A06AE115-60B0-9DAF-1547-03381A2874CC}"/>
+              </a:ext>
+            </a:extLst>
+          </p:cNvPr>
+          <p:cNvSpPr/>
+          <p:nvPr/>
+        </p:nvSpPr>
+        <p:spPr>
+          <a:xfrm>
+            <a:off x="155997" y="1673194"/>
+            <a:ext cx="11612332" cy="4274039"/>
+          </a:xfrm>
+          <a:prstGeom prst="roundRect">
+            <a:avLst/>
+          </a:prstGeom>
+          <a:solidFill>
+            <a:schemeClr val="bg1">
+              <a:lumMod val="95000"/>
+            </a:schemeClr>
+          </a:solidFill>
+          <a:ln>
+            <a:solidFill>
+              <a:schemeClr val="bg1">
+                <a:lumMod val="95000"/>
+              </a:schemeClr>
+            </a:solidFill>
+          </a:ln>
+        </p:spPr>
+        <p:style>
+          <a:lnRef idx="2">
+            <a:schemeClr val="accent1">
+              <a:shade val="15000"/>
+            </a:schemeClr>
+          </a:lnRef>
+          <a:fillRef idx="1">
+            <a:schemeClr val="accent1"/>
+          </a:fillRef>
+          <a:effectRef idx="0">
+            <a:schemeClr val="accent1"/>
+          </a:effectRef>
+          <a:fontRef idx="minor">
+            <a:schemeClr val="lt1"/>
+          </a:fontRef>
+        </p:style>
+        <p:txBody>
+          <a:bodyPr rtlCol="0" anchor="ctr"/>
+          <a:lstStyle/>
+          <a:p>
+            <a:pPr algn="ctr"/>
+            <a:endParaRPr lang="ca-ES" noProof="0" dirty="0"/>
+          </a:p>
+        </p:txBody>
+      </p:sp>
+      <p:sp>
+        <p:nvSpPr>
+          <p:cNvPr id="13" name="Rectángulo: esquinas redondeadas 12">
+            <a:extLst>
+              <a:ext uri="{FF2B5EF4-FFF2-40B4-BE49-F238E27FC236}">
+                <a16:creationId xmlns:a16="http://schemas.microsoft.com/office/drawing/2014/main" id="{E0301D13-0F14-D241-6080-43493343D2E8}"/>
+              </a:ext>
+            </a:extLst>
+          </p:cNvPr>
+          <p:cNvSpPr/>
+          <p:nvPr/>
+        </p:nvSpPr>
+        <p:spPr>
+          <a:xfrm>
+            <a:off x="158865" y="1098099"/>
+            <a:ext cx="2668224" cy="735524"/>
+          </a:xfrm>
+          <a:prstGeom prst="roundRect">
+            <a:avLst/>
+          </a:prstGeom>
+          <a:solidFill>
+            <a:schemeClr val="bg1">
+              <a:lumMod val="85000"/>
+            </a:schemeClr>
+          </a:solidFill>
+          <a:ln>
+            <a:solidFill>
+              <a:schemeClr val="bg1">
+                <a:lumMod val="85000"/>
+              </a:schemeClr>
+            </a:solidFill>
+          </a:ln>
+        </p:spPr>
+        <p:style>
+          <a:lnRef idx="2">
+            <a:schemeClr val="accent1">
+              <a:shade val="15000"/>
+            </a:schemeClr>
+          </a:lnRef>
+          <a:fillRef idx="1">
+            <a:schemeClr val="accent1"/>
+          </a:fillRef>
+          <a:effectRef idx="0">
+            <a:schemeClr val="accent1"/>
+          </a:effectRef>
+          <a:fontRef idx="minor">
+            <a:schemeClr val="lt1"/>
+          </a:fontRef>
+        </p:style>
+        <p:txBody>
+          <a:bodyPr rtlCol="0" anchor="ctr"/>
+          <a:lstStyle/>
+          <a:p>
+            <a:pPr algn="ctr"/>
+            <a:endParaRPr lang="ca-ES" noProof="0" dirty="0"/>
+          </a:p>
+        </p:txBody>
+      </p:sp>
+      <p:pic>
+        <p:nvPicPr>
+          <p:cNvPr id="14" name="Picture 16" descr="Introducción a Docker y la Contenerización | Docker | Chuck's Academy">
+            <a:extLst>
+              <a:ext uri="{FF2B5EF4-FFF2-40B4-BE49-F238E27FC236}">
+                <a16:creationId xmlns:a16="http://schemas.microsoft.com/office/drawing/2014/main" id="{1F954702-1D4F-CA1A-ED55-33285EF4B1C6}"/>
+              </a:ext>
+            </a:extLst>
+          </p:cNvPr>
+          <p:cNvPicPr>
+            <a:picLocks noChangeAspect="1" noChangeArrowheads="1"/>
+          </p:cNvPicPr>
+          <p:nvPr/>
+        </p:nvPicPr>
+        <p:blipFill>
+          <a:blip r:embed="rId3">
+            <a:extLst>
+              <a:ext uri="{28A0092B-C50C-407E-A947-70E740481C1C}">
+                <a14:useLocalDpi xmlns:a14="http://schemas.microsoft.com/office/drawing/2010/main" val="0"/>
+              </a:ext>
+            </a:extLst>
+          </a:blip>
+          <a:srcRect/>
+          <a:stretch>
+            <a:fillRect/>
+          </a:stretch>
+        </p:blipFill>
+        <p:spPr bwMode="auto">
+          <a:xfrm>
+            <a:off x="308628" y="1318170"/>
+            <a:ext cx="987016" cy="253734"/>
+          </a:xfrm>
+          <a:prstGeom prst="rect">
+            <a:avLst/>
+          </a:prstGeom>
+          <a:noFill/>
+          <a:extLst>
+            <a:ext uri="{909E8E84-426E-40DD-AFC4-6F175D3DCCD1}">
+              <a14:hiddenFill xmlns:a14="http://schemas.microsoft.com/office/drawing/2010/main">
+                <a:solidFill>
+                  <a:srgbClr val="FFFFFF"/>
+                </a:solidFill>
+              </a14:hiddenFill>
+            </a:ext>
+          </a:extLst>
+        </p:spPr>
+      </p:pic>
+      <p:sp>
+        <p:nvSpPr>
+          <p:cNvPr id="60" name="Rectángulo: esquinas redondeadas 59">
+            <a:extLst>
+              <a:ext uri="{FF2B5EF4-FFF2-40B4-BE49-F238E27FC236}">
+                <a16:creationId xmlns:a16="http://schemas.microsoft.com/office/drawing/2014/main" id="{9955FE83-25B9-09F8-4773-88059AF8CE91}"/>
+              </a:ext>
+            </a:extLst>
+          </p:cNvPr>
+          <p:cNvSpPr/>
+          <p:nvPr/>
+        </p:nvSpPr>
+        <p:spPr>
+          <a:xfrm>
+            <a:off x="2619156" y="2016811"/>
+            <a:ext cx="2100573" cy="1622327"/>
+          </a:xfrm>
+          <a:prstGeom prst="roundRect">
+            <a:avLst/>
+          </a:prstGeom>
+          <a:solidFill>
+            <a:schemeClr val="bg1">
+              <a:lumMod val="85000"/>
+            </a:schemeClr>
+          </a:solidFill>
+          <a:ln>
+            <a:solidFill>
+              <a:schemeClr val="bg1">
+                <a:lumMod val="85000"/>
+              </a:schemeClr>
+            </a:solidFill>
+          </a:ln>
+        </p:spPr>
+        <p:style>
+          <a:lnRef idx="2">
+            <a:schemeClr val="accent1">
+              <a:shade val="15000"/>
+            </a:schemeClr>
+          </a:lnRef>
+          <a:fillRef idx="1">
+            <a:schemeClr val="accent1"/>
+          </a:fillRef>
+          <a:effectRef idx="0">
+            <a:schemeClr val="accent1"/>
+          </a:effectRef>
+          <a:fontRef idx="minor">
+            <a:schemeClr val="lt1"/>
+          </a:fontRef>
+        </p:style>
+        <p:txBody>
+          <a:bodyPr rtlCol="0" anchor="ctr"/>
+          <a:lstStyle/>
+          <a:p>
+            <a:pPr algn="ctr"/>
+            <a:endParaRPr lang="ca-ES" noProof="0" dirty="0"/>
+          </a:p>
+        </p:txBody>
+      </p:sp>
+      <p:pic>
+        <p:nvPicPr>
+          <p:cNvPr id="61" name="Picture 10">
+            <a:extLst>
+              <a:ext uri="{FF2B5EF4-FFF2-40B4-BE49-F238E27FC236}">
+                <a16:creationId xmlns:a16="http://schemas.microsoft.com/office/drawing/2014/main" id="{1CF9B01B-444F-055F-19EE-B2E43B54321A}"/>
+              </a:ext>
+            </a:extLst>
+          </p:cNvPr>
+          <p:cNvPicPr>
+            <a:picLocks noChangeAspect="1" noChangeArrowheads="1"/>
+          </p:cNvPicPr>
+          <p:nvPr/>
+        </p:nvPicPr>
+        <p:blipFill>
+          <a:blip r:embed="rId4">
+            <a:extLst>
+              <a:ext uri="{28A0092B-C50C-407E-A947-70E740481C1C}">
+                <a14:useLocalDpi xmlns:a14="http://schemas.microsoft.com/office/drawing/2010/main" val="0"/>
+              </a:ext>
+            </a:extLst>
+          </a:blip>
+          <a:srcRect/>
+          <a:stretch>
+            <a:fillRect/>
+          </a:stretch>
+        </p:blipFill>
+        <p:spPr bwMode="auto">
+          <a:xfrm>
+            <a:off x="3008465" y="2572814"/>
+            <a:ext cx="1354304" cy="677153"/>
+          </a:xfrm>
+          <a:prstGeom prst="rect">
+            <a:avLst/>
+          </a:prstGeom>
+          <a:noFill/>
+          <a:extLst>
+            <a:ext uri="{909E8E84-426E-40DD-AFC4-6F175D3DCCD1}">
+              <a14:hiddenFill xmlns:a14="http://schemas.microsoft.com/office/drawing/2010/main">
+                <a:solidFill>
+                  <a:srgbClr val="FFFFFF"/>
+                </a:solidFill>
+              </a14:hiddenFill>
+            </a:ext>
+          </a:extLst>
+        </p:spPr>
+      </p:pic>
+      <p:sp>
+        <p:nvSpPr>
+          <p:cNvPr id="38" name="CuadroTexto 37">
+            <a:extLst>
+              <a:ext uri="{FF2B5EF4-FFF2-40B4-BE49-F238E27FC236}">
+                <a16:creationId xmlns:a16="http://schemas.microsoft.com/office/drawing/2014/main" id="{19FF0C7E-D035-06BC-BC76-CE320EEDDA5E}"/>
+              </a:ext>
+            </a:extLst>
+          </p:cNvPr>
+          <p:cNvSpPr txBox="1"/>
+          <p:nvPr/>
+        </p:nvSpPr>
+        <p:spPr>
+          <a:xfrm>
+            <a:off x="2827089" y="2172574"/>
+            <a:ext cx="1645200" cy="261610"/>
+          </a:xfrm>
+          <a:prstGeom prst="rect">
+            <a:avLst/>
+          </a:prstGeom>
+          <a:noFill/>
+          <a:ln>
+            <a:noFill/>
+          </a:ln>
+        </p:spPr>
+        <p:txBody>
+          <a:bodyPr wrap="square" rtlCol="0">
+            <a:spAutoFit/>
+          </a:bodyPr>
+          <a:lstStyle/>
+          <a:p>
+            <a:pPr algn="ctr"/>
+            <a:r>
+              <a:rPr lang="ca-ES" sz="1100" b="1" dirty="0">
+                <a:latin typeface="+mj-lt"/>
+              </a:rPr>
+              <a:t>Real-</a:t>
+            </a:r>
+            <a:r>
+              <a:rPr lang="ca-ES" sz="1100" b="1" dirty="0" err="1">
+                <a:latin typeface="+mj-lt"/>
+              </a:rPr>
+              <a:t>time</a:t>
+            </a:r>
+            <a:r>
+              <a:rPr lang="ca-ES" sz="1100" b="1" dirty="0">
+                <a:latin typeface="+mj-lt"/>
+              </a:rPr>
+              <a:t> </a:t>
+            </a:r>
+            <a:r>
+              <a:rPr lang="ca-ES" sz="1100" b="1" dirty="0" err="1">
+                <a:latin typeface="+mj-lt"/>
+              </a:rPr>
+              <a:t>Ingeston</a:t>
+            </a:r>
+            <a:endParaRPr lang="ca-ES" sz="1100" noProof="0" dirty="0">
+              <a:latin typeface="+mj-lt"/>
+            </a:endParaRPr>
+          </a:p>
+        </p:txBody>
+      </p:sp>
+      <p:sp>
+        <p:nvSpPr>
+          <p:cNvPr id="63" name="Rectángulo: esquinas redondeadas 62">
+            <a:extLst>
+              <a:ext uri="{FF2B5EF4-FFF2-40B4-BE49-F238E27FC236}">
+                <a16:creationId xmlns:a16="http://schemas.microsoft.com/office/drawing/2014/main" id="{956580AF-39D8-E55F-019B-60CA92E9099F}"/>
+              </a:ext>
+            </a:extLst>
+          </p:cNvPr>
+          <p:cNvSpPr/>
+          <p:nvPr/>
+        </p:nvSpPr>
+        <p:spPr>
+          <a:xfrm>
+            <a:off x="323915" y="1991966"/>
+            <a:ext cx="2100573" cy="3714459"/>
+          </a:xfrm>
+          <a:prstGeom prst="roundRect">
+            <a:avLst/>
+          </a:prstGeom>
+          <a:solidFill>
+            <a:schemeClr val="bg1">
+              <a:lumMod val="85000"/>
+            </a:schemeClr>
+          </a:solidFill>
+          <a:ln>
+            <a:solidFill>
+              <a:schemeClr val="bg1">
+                <a:lumMod val="85000"/>
+              </a:schemeClr>
+            </a:solidFill>
+          </a:ln>
+        </p:spPr>
+        <p:style>
+          <a:lnRef idx="2">
+            <a:schemeClr val="accent1">
+              <a:shade val="15000"/>
+            </a:schemeClr>
+          </a:lnRef>
+          <a:fillRef idx="1">
+            <a:schemeClr val="accent1"/>
+          </a:fillRef>
+          <a:effectRef idx="0">
+            <a:schemeClr val="accent1"/>
+          </a:effectRef>
+          <a:fontRef idx="minor">
+            <a:schemeClr val="lt1"/>
+          </a:fontRef>
+        </p:style>
+        <p:txBody>
+          <a:bodyPr rtlCol="0" anchor="ctr"/>
+          <a:lstStyle/>
+          <a:p>
+            <a:pPr algn="ctr"/>
+            <a:endParaRPr lang="ca-ES" noProof="0" dirty="0"/>
+          </a:p>
+        </p:txBody>
+      </p:sp>
+      <p:sp>
+        <p:nvSpPr>
+          <p:cNvPr id="24" name="CuadroTexto 23">
+            <a:extLst>
+              <a:ext uri="{FF2B5EF4-FFF2-40B4-BE49-F238E27FC236}">
+                <a16:creationId xmlns:a16="http://schemas.microsoft.com/office/drawing/2014/main" id="{AB418F15-BE18-5EDE-7A87-DE79BAD79472}"/>
+              </a:ext>
+            </a:extLst>
+          </p:cNvPr>
+          <p:cNvSpPr txBox="1"/>
+          <p:nvPr/>
+        </p:nvSpPr>
+        <p:spPr>
+          <a:xfrm>
+            <a:off x="496352" y="2209546"/>
+            <a:ext cx="1645200" cy="261610"/>
+          </a:xfrm>
+          <a:prstGeom prst="rect">
+            <a:avLst/>
+          </a:prstGeom>
+          <a:noFill/>
+          <a:ln>
+            <a:noFill/>
+          </a:ln>
+        </p:spPr>
+        <p:txBody>
+          <a:bodyPr wrap="square" rtlCol="0">
+            <a:spAutoFit/>
+          </a:bodyPr>
+          <a:lstStyle/>
+          <a:p>
+            <a:pPr algn="ctr"/>
+            <a:r>
+              <a:rPr lang="ca-ES" sz="1100" b="1" noProof="0" dirty="0">
+                <a:latin typeface="+mj-lt"/>
+              </a:rPr>
+              <a:t>Data </a:t>
+            </a:r>
+            <a:r>
+              <a:rPr lang="ca-ES" sz="1100" b="1" noProof="0" dirty="0" err="1">
+                <a:latin typeface="+mj-lt"/>
+              </a:rPr>
+              <a:t>Sources</a:t>
+            </a:r>
+            <a:endParaRPr lang="ca-ES" sz="1100" b="1" noProof="0" dirty="0">
+              <a:latin typeface="+mj-lt"/>
+            </a:endParaRPr>
+          </a:p>
+        </p:txBody>
+      </p:sp>
+      <p:grpSp>
+        <p:nvGrpSpPr>
+          <p:cNvPr id="46" name="Grupo 45">
+            <a:extLst>
+              <a:ext uri="{FF2B5EF4-FFF2-40B4-BE49-F238E27FC236}">
+                <a16:creationId xmlns:a16="http://schemas.microsoft.com/office/drawing/2014/main" id="{4AEB0490-91AD-77A1-CBB6-A91C3B60314D}"/>
+              </a:ext>
+            </a:extLst>
+          </p:cNvPr>
+          <p:cNvGrpSpPr/>
+          <p:nvPr/>
+        </p:nvGrpSpPr>
+        <p:grpSpPr>
+          <a:xfrm>
+            <a:off x="525932" y="2770492"/>
+            <a:ext cx="1755920" cy="1608448"/>
+            <a:chOff x="525720" y="3274318"/>
+            <a:chExt cx="3673275" cy="3226527"/>
+          </a:xfrm>
+        </p:grpSpPr>
+        <p:pic>
+          <p:nvPicPr>
+            <p:cNvPr id="47" name="Picture 2" descr="Los supermercados más caros y más baratos de España: busca el tuyo |  Economía y negocios | Actualidad | Cadena SER">
+              <a:extLst>
+                <a:ext uri="{FF2B5EF4-FFF2-40B4-BE49-F238E27FC236}">
+                  <a16:creationId xmlns:a16="http://schemas.microsoft.com/office/drawing/2014/main" id="{5F6B9C40-F9FA-51DA-711A-60EEC7D1743C}"/>
+                </a:ext>
+              </a:extLst>
+            </p:cNvPr>
+            <p:cNvPicPr>
+              <a:picLocks noChangeAspect="1" noChangeArrowheads="1"/>
+            </p:cNvPicPr>
+            <p:nvPr/>
+          </p:nvPicPr>
+          <p:blipFill>
+            <a:blip r:embed="rId5">
+              <a:extLst>
+                <a:ext uri="{28A0092B-C50C-407E-A947-70E740481C1C}">
+                  <a14:useLocalDpi xmlns:a14="http://schemas.microsoft.com/office/drawing/2010/main" val="0"/>
+                </a:ext>
+              </a:extLst>
+            </a:blip>
+            <a:srcRect/>
+            <a:stretch>
+              <a:fillRect/>
+            </a:stretch>
+          </p:blipFill>
+          <p:spPr bwMode="auto">
+            <a:xfrm>
+              <a:off x="678030" y="3274318"/>
+              <a:ext cx="2789482" cy="1630217"/>
+            </a:xfrm>
+            <a:prstGeom prst="rect">
+              <a:avLst/>
+            </a:prstGeom>
+            <a:noFill/>
+            <a:extLst>
+              <a:ext uri="{909E8E84-426E-40DD-AFC4-6F175D3DCCD1}">
+                <a14:hiddenFill xmlns:a14="http://schemas.microsoft.com/office/drawing/2010/main">
+                  <a:solidFill>
+                    <a:srgbClr val="FFFFFF"/>
+                  </a:solidFill>
+                </a14:hiddenFill>
+              </a:ext>
+            </a:extLst>
+          </p:spPr>
+        </p:pic>
+        <p:grpSp>
+          <p:nvGrpSpPr>
+            <p:cNvPr id="48" name="Grupo 47">
+              <a:extLst>
+                <a:ext uri="{FF2B5EF4-FFF2-40B4-BE49-F238E27FC236}">
+                  <a16:creationId xmlns:a16="http://schemas.microsoft.com/office/drawing/2014/main" id="{EA19162E-51BC-1AB0-9918-EFD4FD7F63FE}"/>
+                </a:ext>
+              </a:extLst>
+            </p:cNvPr>
+            <p:cNvGrpSpPr/>
+            <p:nvPr/>
+          </p:nvGrpSpPr>
+          <p:grpSpPr>
+            <a:xfrm>
+              <a:off x="525720" y="4657260"/>
+              <a:ext cx="1646246" cy="1843585"/>
+              <a:chOff x="6593305" y="3963505"/>
+              <a:chExt cx="2654609" cy="2550230"/>
+            </a:xfrm>
+          </p:grpSpPr>
+          <p:pic>
+            <p:nvPicPr>
+              <p:cNvPr id="52" name="Imagen 51">
+                <a:extLst>
+                  <a:ext uri="{FF2B5EF4-FFF2-40B4-BE49-F238E27FC236}">
+                    <a16:creationId xmlns:a16="http://schemas.microsoft.com/office/drawing/2014/main" id="{BD1508E4-3B80-4E6D-FB94-3EBE80801BE6}"/>
+                  </a:ext>
+                </a:extLst>
+              </p:cNvPr>
+              <p:cNvPicPr>
+                <a:picLocks noChangeAspect="1"/>
+              </p:cNvPicPr>
+              <p:nvPr/>
+            </p:nvPicPr>
+            <p:blipFill>
+              <a:blip r:embed="rId6"/>
+              <a:stretch>
+                <a:fillRect/>
+              </a:stretch>
+            </p:blipFill>
+            <p:spPr>
+              <a:xfrm>
+                <a:off x="6699183" y="4241009"/>
+                <a:ext cx="2548731" cy="2272726"/>
+              </a:xfrm>
+              <a:prstGeom prst="rect">
+                <a:avLst/>
+              </a:prstGeom>
+              <a:solidFill>
+                <a:srgbClr val="FFFFFF">
+                  <a:shade val="85000"/>
+                </a:srgbClr>
+              </a:solidFill>
+              <a:ln w="190500" cap="rnd">
+                <a:solidFill>
+                  <a:srgbClr val="FFFFFF"/>
+                </a:solidFill>
+              </a:ln>
+              <a:effectLst>
+                <a:outerShdw blurRad="50000" algn="tl" rotWithShape="0">
+                  <a:srgbClr val="000000">
+                    <a:alpha val="41000"/>
+                  </a:srgbClr>
+                </a:outerShdw>
+              </a:effectLst>
+              <a:scene3d>
+                <a:camera prst="orthographicFront"/>
+                <a:lightRig rig="twoPt" dir="t">
+                  <a:rot lat="0" lon="0" rev="7800000"/>
+                </a:lightRig>
+              </a:scene3d>
+              <a:sp3d contourW="6350">
+                <a:bevelT w="50800" h="16510"/>
+                <a:contourClr>
+                  <a:srgbClr val="C0C0C0"/>
+                </a:contourClr>
+              </a:sp3d>
+            </p:spPr>
+          </p:pic>
+          <p:pic>
+            <p:nvPicPr>
+              <p:cNvPr id="53" name="Picture 4" descr="Dieselogasolina.com">
+                <a:extLst>
+                  <a:ext uri="{FF2B5EF4-FFF2-40B4-BE49-F238E27FC236}">
+                    <a16:creationId xmlns:a16="http://schemas.microsoft.com/office/drawing/2014/main" id="{1CC44842-14D5-E6E7-87FD-E3495CD4DF89}"/>
+                  </a:ext>
+                </a:extLst>
+              </p:cNvPr>
+              <p:cNvPicPr>
+                <a:picLocks noChangeAspect="1" noChangeArrowheads="1"/>
+              </p:cNvPicPr>
+              <p:nvPr/>
+            </p:nvPicPr>
+            <p:blipFill>
+              <a:blip r:embed="rId7">
+                <a:extLst>
+                  <a:ext uri="{28A0092B-C50C-407E-A947-70E740481C1C}">
+                    <a14:useLocalDpi xmlns:a14="http://schemas.microsoft.com/office/drawing/2010/main" val="0"/>
+                  </a:ext>
+                </a:extLst>
+              </a:blip>
+              <a:srcRect/>
+              <a:stretch>
+                <a:fillRect/>
+              </a:stretch>
+            </p:blipFill>
+            <p:spPr bwMode="auto">
+              <a:xfrm>
+                <a:off x="6593305" y="3963505"/>
+                <a:ext cx="555007" cy="555007"/>
+              </a:xfrm>
+              <a:prstGeom prst="rect">
+                <a:avLst/>
+              </a:prstGeom>
+              <a:noFill/>
+              <a:extLst>
+                <a:ext uri="{909E8E84-426E-40DD-AFC4-6F175D3DCCD1}">
+                  <a14:hiddenFill xmlns:a14="http://schemas.microsoft.com/office/drawing/2010/main">
+                    <a:solidFill>
+                      <a:srgbClr val="FFFFFF"/>
+                    </a:solidFill>
+                  </a14:hiddenFill>
+                </a:ext>
+              </a:extLst>
+            </p:spPr>
+          </p:pic>
+        </p:grpSp>
+        <p:pic>
+          <p:nvPicPr>
+            <p:cNvPr id="49" name="Picture 6" descr="El fondo sueco EQT compra Idealista por 1.321 millones - Forbes España">
+              <a:extLst>
+                <a:ext uri="{FF2B5EF4-FFF2-40B4-BE49-F238E27FC236}">
+                  <a16:creationId xmlns:a16="http://schemas.microsoft.com/office/drawing/2014/main" id="{8E886239-7839-170E-B92C-C6D76513A9A2}"/>
+                </a:ext>
+              </a:extLst>
+            </p:cNvPr>
+            <p:cNvPicPr>
+              <a:picLocks noChangeAspect="1" noChangeArrowheads="1"/>
+            </p:cNvPicPr>
+            <p:nvPr/>
+          </p:nvPicPr>
+          <p:blipFill>
+            <a:blip r:embed="rId8">
+              <a:extLst>
+                <a:ext uri="{28A0092B-C50C-407E-A947-70E740481C1C}">
+                  <a14:useLocalDpi xmlns:a14="http://schemas.microsoft.com/office/drawing/2010/main" val="0"/>
+                </a:ext>
+              </a:extLst>
+            </a:blip>
+            <a:srcRect/>
+            <a:stretch>
+              <a:fillRect/>
+            </a:stretch>
+          </p:blipFill>
+          <p:spPr bwMode="auto">
+            <a:xfrm>
+              <a:off x="2172759" y="4842952"/>
+              <a:ext cx="2026236" cy="773755"/>
+            </a:xfrm>
+            <a:prstGeom prst="rect">
+              <a:avLst/>
+            </a:prstGeom>
+            <a:noFill/>
+            <a:extLst>
+              <a:ext uri="{909E8E84-426E-40DD-AFC4-6F175D3DCCD1}">
+                <a14:hiddenFill xmlns:a14="http://schemas.microsoft.com/office/drawing/2010/main">
+                  <a:solidFill>
+                    <a:srgbClr val="FFFFFF"/>
+                  </a:solidFill>
+                </a14:hiddenFill>
+              </a:ext>
+            </a:extLst>
+          </p:spPr>
+        </p:pic>
+        <p:pic>
+          <p:nvPicPr>
+            <p:cNvPr id="50" name="Picture 8" descr="Nueva imagen de Fotocasa – Graficatessen">
+              <a:extLst>
+                <a:ext uri="{FF2B5EF4-FFF2-40B4-BE49-F238E27FC236}">
+                  <a16:creationId xmlns:a16="http://schemas.microsoft.com/office/drawing/2014/main" id="{E7DF097D-F5A7-BAE1-BBF7-03B40210ECFF}"/>
+                </a:ext>
+              </a:extLst>
+            </p:cNvPr>
+            <p:cNvPicPr>
+              <a:picLocks noChangeAspect="1" noChangeArrowheads="1"/>
+            </p:cNvPicPr>
+            <p:nvPr/>
+          </p:nvPicPr>
+          <p:blipFill>
+            <a:blip r:embed="rId9">
+              <a:extLst>
+                <a:ext uri="{28A0092B-C50C-407E-A947-70E740481C1C}">
+                  <a14:useLocalDpi xmlns:a14="http://schemas.microsoft.com/office/drawing/2010/main" val="0"/>
+                </a:ext>
+              </a:extLst>
+            </a:blip>
+            <a:srcRect/>
+            <a:stretch>
+              <a:fillRect/>
+            </a:stretch>
+          </p:blipFill>
+          <p:spPr bwMode="auto">
+            <a:xfrm>
+              <a:off x="2986276" y="5445899"/>
+              <a:ext cx="1212719" cy="698247"/>
+            </a:xfrm>
+            <a:prstGeom prst="rect">
+              <a:avLst/>
+            </a:prstGeom>
+            <a:noFill/>
+            <a:extLst>
+              <a:ext uri="{909E8E84-426E-40DD-AFC4-6F175D3DCCD1}">
+                <a14:hiddenFill xmlns:a14="http://schemas.microsoft.com/office/drawing/2010/main">
+                  <a:solidFill>
+                    <a:srgbClr val="FFFFFF"/>
+                  </a:solidFill>
+                </a14:hiddenFill>
+              </a:ext>
+            </a:extLst>
+          </p:spPr>
+        </p:pic>
+        <p:pic>
+          <p:nvPicPr>
+            <p:cNvPr id="51" name="Imagen 50">
+              <a:extLst>
+                <a:ext uri="{FF2B5EF4-FFF2-40B4-BE49-F238E27FC236}">
+                  <a16:creationId xmlns:a16="http://schemas.microsoft.com/office/drawing/2014/main" id="{6A571299-990D-87D5-2D4B-20BCE3C2A24A}"/>
+                </a:ext>
+              </a:extLst>
+            </p:cNvPr>
+            <p:cNvPicPr>
+              <a:picLocks noChangeAspect="1"/>
+            </p:cNvPicPr>
+            <p:nvPr/>
+          </p:nvPicPr>
+          <p:blipFill>
+            <a:blip r:embed="rId10"/>
+            <a:stretch>
+              <a:fillRect/>
+            </a:stretch>
+          </p:blipFill>
+          <p:spPr>
+            <a:xfrm>
+              <a:off x="2135909" y="5973405"/>
+              <a:ext cx="1771542" cy="433520"/>
+            </a:xfrm>
+            <a:prstGeom prst="rect">
+              <a:avLst/>
+            </a:prstGeom>
+          </p:spPr>
+        </p:pic>
+      </p:grpSp>
+      <p:sp>
+        <p:nvSpPr>
+          <p:cNvPr id="55" name="Rectángulo: esquinas redondeadas 54">
+            <a:extLst>
+              <a:ext uri="{FF2B5EF4-FFF2-40B4-BE49-F238E27FC236}">
+                <a16:creationId xmlns:a16="http://schemas.microsoft.com/office/drawing/2014/main" id="{9B7B1188-822D-FF6A-C6B0-B595E26EC567}"/>
+              </a:ext>
+            </a:extLst>
+          </p:cNvPr>
+          <p:cNvSpPr/>
+          <p:nvPr/>
+        </p:nvSpPr>
+        <p:spPr>
+          <a:xfrm>
+            <a:off x="736063" y="5317627"/>
+            <a:ext cx="1747749" cy="546931"/>
+          </a:xfrm>
+          <a:prstGeom prst="roundRect">
+            <a:avLst/>
+          </a:prstGeom>
+          <a:solidFill>
+            <a:schemeClr val="bg1">
+              <a:lumMod val="65000"/>
+            </a:schemeClr>
+          </a:solidFill>
+          <a:ln>
+            <a:noFill/>
+          </a:ln>
+          <a:effectLst>
+            <a:outerShdw blurRad="50800" dist="38100" dir="8100000" algn="tr" rotWithShape="0">
+              <a:prstClr val="black">
+                <a:alpha val="40000"/>
+              </a:prstClr>
+            </a:outerShdw>
+          </a:effectLst>
+        </p:spPr>
+        <p:style>
+          <a:lnRef idx="2">
+            <a:schemeClr val="accent1">
+              <a:shade val="15000"/>
+            </a:schemeClr>
+          </a:lnRef>
+          <a:fillRef idx="1">
+            <a:schemeClr val="accent1"/>
+          </a:fillRef>
+          <a:effectRef idx="0">
+            <a:schemeClr val="accent1"/>
+          </a:effectRef>
+          <a:fontRef idx="minor">
+            <a:schemeClr val="lt1"/>
+          </a:fontRef>
+        </p:style>
+        <p:txBody>
+          <a:bodyPr rtlCol="0" anchor="ctr"/>
+          <a:lstStyle/>
+          <a:p>
+            <a:pPr algn="ctr"/>
+            <a:endParaRPr lang="ca-ES" noProof="0" dirty="0"/>
+          </a:p>
+        </p:txBody>
+      </p:sp>
+      <p:grpSp>
+        <p:nvGrpSpPr>
+          <p:cNvPr id="56" name="Grupo 55">
+            <a:extLst>
+              <a:ext uri="{FF2B5EF4-FFF2-40B4-BE49-F238E27FC236}">
+                <a16:creationId xmlns:a16="http://schemas.microsoft.com/office/drawing/2014/main" id="{725A9536-3D77-4862-21B2-9BD24FE2C985}"/>
+              </a:ext>
+            </a:extLst>
+          </p:cNvPr>
+          <p:cNvGrpSpPr/>
+          <p:nvPr/>
+        </p:nvGrpSpPr>
+        <p:grpSpPr>
+          <a:xfrm>
+            <a:off x="815678" y="5361776"/>
+            <a:ext cx="731195" cy="457677"/>
+            <a:chOff x="8938262" y="4805558"/>
+            <a:chExt cx="1108398" cy="709066"/>
+          </a:xfrm>
+        </p:grpSpPr>
+        <p:pic>
+          <p:nvPicPr>
+            <p:cNvPr id="57" name="Picture 12" descr="Overview - ScrapeGraphAI documentation">
+              <a:extLst>
+                <a:ext uri="{FF2B5EF4-FFF2-40B4-BE49-F238E27FC236}">
+                  <a16:creationId xmlns:a16="http://schemas.microsoft.com/office/drawing/2014/main" id="{477497AE-47AE-C98C-C6AD-545008289FF9}"/>
+                </a:ext>
+              </a:extLst>
+            </p:cNvPr>
+            <p:cNvPicPr>
+              <a:picLocks noChangeAspect="1" noChangeArrowheads="1"/>
+            </p:cNvPicPr>
+            <p:nvPr/>
+          </p:nvPicPr>
+          <p:blipFill>
+            <a:blip r:embed="rId11">
+              <a:extLst>
+                <a:ext uri="{28A0092B-C50C-407E-A947-70E740481C1C}">
+                  <a14:useLocalDpi xmlns:a14="http://schemas.microsoft.com/office/drawing/2010/main" val="0"/>
+                </a:ext>
+              </a:extLst>
+            </a:blip>
+            <a:srcRect/>
+            <a:stretch>
+              <a:fillRect/>
+            </a:stretch>
+          </p:blipFill>
+          <p:spPr bwMode="auto">
+            <a:xfrm>
+              <a:off x="9159179" y="4805558"/>
+              <a:ext cx="542149" cy="460522"/>
+            </a:xfrm>
+            <a:prstGeom prst="rect">
+              <a:avLst/>
+            </a:prstGeom>
+            <a:noFill/>
+            <a:extLst>
+              <a:ext uri="{909E8E84-426E-40DD-AFC4-6F175D3DCCD1}">
+                <a14:hiddenFill xmlns:a14="http://schemas.microsoft.com/office/drawing/2010/main">
+                  <a:solidFill>
+                    <a:srgbClr val="FFFFFF"/>
+                  </a:solidFill>
+                </a14:hiddenFill>
+              </a:ext>
+            </a:extLst>
+          </p:spPr>
+        </p:pic>
+        <p:sp>
+          <p:nvSpPr>
+            <p:cNvPr id="58" name="CuadroTexto 57">
+              <a:extLst>
+                <a:ext uri="{FF2B5EF4-FFF2-40B4-BE49-F238E27FC236}">
+                  <a16:creationId xmlns:a16="http://schemas.microsoft.com/office/drawing/2014/main" id="{BB0C1B71-8EE1-52CB-F254-21523B0379CE}"/>
+                </a:ext>
+              </a:extLst>
+            </p:cNvPr>
+            <p:cNvSpPr txBox="1"/>
+            <p:nvPr/>
+          </p:nvSpPr>
+          <p:spPr>
+            <a:xfrm>
+              <a:off x="8938262" y="5258080"/>
+              <a:ext cx="1108398" cy="256544"/>
+            </a:xfrm>
+            <a:prstGeom prst="rect">
+              <a:avLst/>
+            </a:prstGeom>
+            <a:noFill/>
+            <a:ln>
+              <a:noFill/>
+            </a:ln>
+          </p:spPr>
+          <p:txBody>
+            <a:bodyPr wrap="none" rtlCol="0">
+              <a:spAutoFit/>
+            </a:bodyPr>
+            <a:lstStyle/>
+            <a:p>
+              <a:r>
+                <a:rPr lang="ca-ES" sz="700" dirty="0">
+                  <a:latin typeface="+mj-lt"/>
+                  <a:hlinkClick r:id="rId12"/>
+                </a:rPr>
+                <a:t>ScrapeGraphAI</a:t>
+              </a:r>
+              <a:endParaRPr lang="ca-ES" sz="1050" dirty="0">
+                <a:latin typeface="+mj-lt"/>
+              </a:endParaRPr>
+            </a:p>
+          </p:txBody>
+        </p:sp>
+      </p:grpSp>
+      <p:pic>
+        <p:nvPicPr>
+          <p:cNvPr id="59" name="Imagen 58">
+            <a:extLst>
+              <a:ext uri="{FF2B5EF4-FFF2-40B4-BE49-F238E27FC236}">
+                <a16:creationId xmlns:a16="http://schemas.microsoft.com/office/drawing/2014/main" id="{F10093E9-A55F-A08A-3C79-4C420D787363}"/>
+              </a:ext>
+            </a:extLst>
+          </p:cNvPr>
+          <p:cNvPicPr>
+            <a:picLocks noChangeAspect="1"/>
+          </p:cNvPicPr>
+          <p:nvPr/>
+        </p:nvPicPr>
+        <p:blipFill>
+          <a:blip r:embed="rId13"/>
+          <a:stretch>
+            <a:fillRect/>
+          </a:stretch>
+        </p:blipFill>
+        <p:spPr>
+          <a:xfrm>
+            <a:off x="1556589" y="5444489"/>
+            <a:ext cx="867899" cy="246616"/>
+          </a:xfrm>
+          <a:prstGeom prst="rect">
+            <a:avLst/>
+          </a:prstGeom>
+        </p:spPr>
+      </p:pic>
+      <p:sp>
+        <p:nvSpPr>
+          <p:cNvPr id="1024" name="Rectángulo: esquinas redondeadas 1023">
+            <a:extLst>
+              <a:ext uri="{FF2B5EF4-FFF2-40B4-BE49-F238E27FC236}">
+                <a16:creationId xmlns:a16="http://schemas.microsoft.com/office/drawing/2014/main" id="{575BC024-288A-911A-0D98-E14C81E24ED3}"/>
+              </a:ext>
+            </a:extLst>
+          </p:cNvPr>
+          <p:cNvSpPr/>
+          <p:nvPr/>
+        </p:nvSpPr>
+        <p:spPr>
+          <a:xfrm>
+            <a:off x="2607836" y="3836462"/>
+            <a:ext cx="2100573" cy="1758040"/>
+          </a:xfrm>
+          <a:prstGeom prst="roundRect">
+            <a:avLst/>
+          </a:prstGeom>
+          <a:solidFill>
+            <a:schemeClr val="bg1">
+              <a:lumMod val="85000"/>
+            </a:schemeClr>
+          </a:solidFill>
+          <a:ln>
+            <a:solidFill>
+              <a:schemeClr val="bg1">
+                <a:lumMod val="85000"/>
+              </a:schemeClr>
+            </a:solidFill>
+          </a:ln>
+        </p:spPr>
+        <p:style>
+          <a:lnRef idx="2">
+            <a:schemeClr val="accent1">
+              <a:shade val="15000"/>
+            </a:schemeClr>
+          </a:lnRef>
+          <a:fillRef idx="1">
+            <a:schemeClr val="accent1"/>
+          </a:fillRef>
+          <a:effectRef idx="0">
+            <a:schemeClr val="accent1"/>
+          </a:effectRef>
+          <a:fontRef idx="minor">
+            <a:schemeClr val="lt1"/>
+          </a:fontRef>
+        </p:style>
+        <p:txBody>
+          <a:bodyPr rtlCol="0" anchor="ctr"/>
+          <a:lstStyle/>
+          <a:p>
+            <a:pPr algn="ctr"/>
+            <a:endParaRPr lang="ca-ES" noProof="0" dirty="0"/>
+          </a:p>
+        </p:txBody>
+      </p:sp>
+      <p:sp>
+        <p:nvSpPr>
+          <p:cNvPr id="1025" name="Rectángulo: esquinas redondeadas 1024">
+            <a:extLst>
+              <a:ext uri="{FF2B5EF4-FFF2-40B4-BE49-F238E27FC236}">
+                <a16:creationId xmlns:a16="http://schemas.microsoft.com/office/drawing/2014/main" id="{7AF7399D-092C-8DF9-FCCE-5E761437AAAC}"/>
+              </a:ext>
+            </a:extLst>
+          </p:cNvPr>
+          <p:cNvSpPr/>
+          <p:nvPr/>
+        </p:nvSpPr>
+        <p:spPr>
+          <a:xfrm>
+            <a:off x="4914397" y="1975133"/>
+            <a:ext cx="2100573" cy="3714459"/>
+          </a:xfrm>
+          <a:prstGeom prst="roundRect">
+            <a:avLst/>
+          </a:prstGeom>
+          <a:solidFill>
+            <a:schemeClr val="bg1">
+              <a:lumMod val="85000"/>
+            </a:schemeClr>
+          </a:solidFill>
+          <a:ln>
+            <a:solidFill>
+              <a:schemeClr val="bg1">
+                <a:lumMod val="85000"/>
+              </a:schemeClr>
+            </a:solidFill>
+          </a:ln>
+        </p:spPr>
+        <p:style>
+          <a:lnRef idx="2">
+            <a:schemeClr val="accent1">
+              <a:shade val="15000"/>
+            </a:schemeClr>
+          </a:lnRef>
+          <a:fillRef idx="1">
+            <a:schemeClr val="accent1"/>
+          </a:fillRef>
+          <a:effectRef idx="0">
+            <a:schemeClr val="accent1"/>
+          </a:effectRef>
+          <a:fontRef idx="minor">
+            <a:schemeClr val="lt1"/>
+          </a:fontRef>
+        </p:style>
+        <p:txBody>
+          <a:bodyPr rtlCol="0" anchor="ctr"/>
+          <a:lstStyle/>
+          <a:p>
+            <a:pPr algn="ctr"/>
+            <a:endParaRPr lang="ca-ES" noProof="0" dirty="0"/>
+          </a:p>
+        </p:txBody>
+      </p:sp>
+      <p:sp>
+        <p:nvSpPr>
+          <p:cNvPr id="41" name="CuadroTexto 40">
+            <a:extLst>
+              <a:ext uri="{FF2B5EF4-FFF2-40B4-BE49-F238E27FC236}">
+                <a16:creationId xmlns:a16="http://schemas.microsoft.com/office/drawing/2014/main" id="{F2892B55-2FEE-7ED1-9CC1-DA4649124557}"/>
+              </a:ext>
+            </a:extLst>
+          </p:cNvPr>
+          <p:cNvSpPr txBox="1"/>
+          <p:nvPr/>
+        </p:nvSpPr>
+        <p:spPr>
+          <a:xfrm>
+            <a:off x="2827089" y="3977339"/>
+            <a:ext cx="1645200" cy="261610"/>
+          </a:xfrm>
+          <a:prstGeom prst="rect">
+            <a:avLst/>
+          </a:prstGeom>
+          <a:noFill/>
+          <a:ln>
+            <a:noFill/>
+          </a:ln>
+        </p:spPr>
+        <p:txBody>
+          <a:bodyPr wrap="square" rtlCol="0">
+            <a:spAutoFit/>
+          </a:bodyPr>
+          <a:lstStyle/>
+          <a:p>
+            <a:pPr algn="ctr"/>
+            <a:r>
+              <a:rPr lang="ca-ES" sz="1100" b="1" dirty="0" err="1">
+                <a:latin typeface="+mj-lt"/>
+              </a:rPr>
+              <a:t>Stream</a:t>
+            </a:r>
+            <a:r>
+              <a:rPr lang="ca-ES" sz="1100" b="1" dirty="0">
+                <a:latin typeface="+mj-lt"/>
+              </a:rPr>
+              <a:t> </a:t>
+            </a:r>
+            <a:r>
+              <a:rPr lang="ca-ES" sz="1100" b="1" dirty="0" err="1">
+                <a:latin typeface="+mj-lt"/>
+              </a:rPr>
+              <a:t>processing</a:t>
+            </a:r>
+            <a:endParaRPr lang="ca-ES" sz="1100" noProof="0" dirty="0">
+              <a:latin typeface="+mj-lt"/>
+            </a:endParaRPr>
+          </a:p>
+        </p:txBody>
+      </p:sp>
+      <p:pic>
+        <p:nvPicPr>
+          <p:cNvPr id="1027" name="Picture 8" descr="Getting started with Spark Structured Streaming and Kafka – Software  Development Tutorials">
+            <a:extLst>
+              <a:ext uri="{FF2B5EF4-FFF2-40B4-BE49-F238E27FC236}">
+                <a16:creationId xmlns:a16="http://schemas.microsoft.com/office/drawing/2014/main" id="{C38E6975-D8CE-8F83-4DEE-873B89F49E56}"/>
+              </a:ext>
+            </a:extLst>
+          </p:cNvPr>
+          <p:cNvPicPr>
+            <a:picLocks noChangeAspect="1"/>
+          </p:cNvPicPr>
+          <p:nvPr/>
+        </p:nvPicPr>
+        <p:blipFill>
+          <a:blip r:embed="rId14"/>
+          <a:srcRect/>
+          <a:stretch>
+            <a:fillRect/>
+          </a:stretch>
+        </p:blipFill>
+        <p:spPr>
+          <a:xfrm>
+            <a:off x="3097015" y="4438987"/>
+            <a:ext cx="1061514" cy="785046"/>
+          </a:xfrm>
+          <a:prstGeom prst="rect">
+            <a:avLst/>
+          </a:prstGeom>
+          <a:noFill/>
+          <a:ln cap="flat">
+            <a:noFill/>
+          </a:ln>
+        </p:spPr>
+      </p:pic>
+      <p:sp>
+        <p:nvSpPr>
+          <p:cNvPr id="33" name="CuadroTexto 32">
+            <a:extLst>
+              <a:ext uri="{FF2B5EF4-FFF2-40B4-BE49-F238E27FC236}">
+                <a16:creationId xmlns:a16="http://schemas.microsoft.com/office/drawing/2014/main" id="{547659BB-7355-6B8B-35DA-F9E826568479}"/>
+              </a:ext>
+            </a:extLst>
+          </p:cNvPr>
+          <p:cNvSpPr txBox="1"/>
+          <p:nvPr/>
+        </p:nvSpPr>
+        <p:spPr>
+          <a:xfrm>
+            <a:off x="5166316" y="2149376"/>
+            <a:ext cx="1645200" cy="430887"/>
+          </a:xfrm>
+          <a:prstGeom prst="rect">
+            <a:avLst/>
+          </a:prstGeom>
+          <a:noFill/>
+          <a:ln>
+            <a:noFill/>
+          </a:ln>
+        </p:spPr>
+        <p:txBody>
+          <a:bodyPr wrap="square" rtlCol="0">
+            <a:spAutoFit/>
+          </a:bodyPr>
+          <a:lstStyle/>
+          <a:p>
+            <a:pPr algn="ctr"/>
+            <a:r>
+              <a:rPr lang="ca-ES" sz="1100" b="1" noProof="0" dirty="0">
+                <a:latin typeface="+mj-lt"/>
+              </a:rPr>
+              <a:t>Data </a:t>
+            </a:r>
+            <a:r>
+              <a:rPr lang="ca-ES" sz="1100" b="1" noProof="0" dirty="0" err="1">
+                <a:latin typeface="+mj-lt"/>
+              </a:rPr>
+              <a:t>Storage</a:t>
+            </a:r>
+            <a:r>
+              <a:rPr lang="ca-ES" sz="1100" b="1" noProof="0" dirty="0">
+                <a:latin typeface="+mj-lt"/>
+              </a:rPr>
+              <a:t> </a:t>
+            </a:r>
+            <a:r>
+              <a:rPr lang="ca-ES" sz="1100" noProof="0" dirty="0">
+                <a:latin typeface="+mj-lt"/>
+              </a:rPr>
+              <a:t>(Data </a:t>
+            </a:r>
+            <a:r>
+              <a:rPr lang="ca-ES" sz="1100" noProof="0" dirty="0" err="1">
+                <a:latin typeface="+mj-lt"/>
+              </a:rPr>
+              <a:t>Wherehouse</a:t>
+            </a:r>
+            <a:r>
+              <a:rPr lang="ca-ES" sz="1100" noProof="0" dirty="0">
+                <a:latin typeface="+mj-lt"/>
+              </a:rPr>
+              <a:t>)</a:t>
+            </a:r>
+          </a:p>
+        </p:txBody>
+      </p:sp>
+      <p:pic>
+        <p:nvPicPr>
+          <p:cNvPr id="1028" name="Picture 4" descr="Postgresql llano marca logo - Iconos Social Media y Logos">
+            <a:extLst>
+              <a:ext uri="{FF2B5EF4-FFF2-40B4-BE49-F238E27FC236}">
+                <a16:creationId xmlns:a16="http://schemas.microsoft.com/office/drawing/2014/main" id="{55BBBD94-502E-0290-E64C-8153BC0D3FA7}"/>
+              </a:ext>
+            </a:extLst>
+          </p:cNvPr>
+          <p:cNvPicPr>
+            <a:picLocks noChangeAspect="1" noChangeArrowheads="1"/>
+          </p:cNvPicPr>
+          <p:nvPr/>
+        </p:nvPicPr>
+        <p:blipFill>
+          <a:blip r:embed="rId15">
+            <a:extLst>
+              <a:ext uri="{28A0092B-C50C-407E-A947-70E740481C1C}">
+                <a14:useLocalDpi xmlns:a14="http://schemas.microsoft.com/office/drawing/2010/main" val="0"/>
+              </a:ext>
+            </a:extLst>
+          </a:blip>
+          <a:srcRect/>
+          <a:stretch>
+            <a:fillRect/>
+          </a:stretch>
+        </p:blipFill>
+        <p:spPr bwMode="auto">
+          <a:xfrm>
+            <a:off x="5385242" y="2831431"/>
+            <a:ext cx="1145988" cy="1145988"/>
+          </a:xfrm>
+          <a:prstGeom prst="rect">
+            <a:avLst/>
+          </a:prstGeom>
+          <a:noFill/>
+          <a:extLst>
+            <a:ext uri="{909E8E84-426E-40DD-AFC4-6F175D3DCCD1}">
+              <a14:hiddenFill xmlns:a14="http://schemas.microsoft.com/office/drawing/2010/main">
+                <a:solidFill>
+                  <a:srgbClr val="FFFFFF"/>
+                </a:solidFill>
+              </a14:hiddenFill>
+            </a:ext>
+          </a:extLst>
+        </p:spPr>
+      </p:pic>
+      <p:pic>
+        <p:nvPicPr>
+          <p:cNvPr id="1030" name="Picture 6" descr="TimescaleDB">
+            <a:extLst>
+              <a:ext uri="{FF2B5EF4-FFF2-40B4-BE49-F238E27FC236}">
+                <a16:creationId xmlns:a16="http://schemas.microsoft.com/office/drawing/2014/main" id="{209D535A-97B4-474B-00F4-90F49EB709AE}"/>
+              </a:ext>
+            </a:extLst>
+          </p:cNvPr>
+          <p:cNvPicPr>
+            <a:picLocks noChangeAspect="1" noChangeArrowheads="1"/>
+          </p:cNvPicPr>
+          <p:nvPr/>
+        </p:nvPicPr>
+        <p:blipFill>
+          <a:blip r:embed="rId16">
+            <a:extLst>
+              <a:ext uri="{28A0092B-C50C-407E-A947-70E740481C1C}">
+                <a14:useLocalDpi xmlns:a14="http://schemas.microsoft.com/office/drawing/2010/main" val="0"/>
+              </a:ext>
+            </a:extLst>
+          </a:blip>
+          <a:srcRect/>
+          <a:stretch>
+            <a:fillRect/>
+          </a:stretch>
+        </p:blipFill>
+        <p:spPr bwMode="auto">
+          <a:xfrm>
+            <a:off x="5197588" y="4438987"/>
+            <a:ext cx="1639944" cy="430887"/>
+          </a:xfrm>
+          <a:prstGeom prst="rect">
+            <a:avLst/>
+          </a:prstGeom>
+          <a:noFill/>
+          <a:extLst>
+            <a:ext uri="{909E8E84-426E-40DD-AFC4-6F175D3DCCD1}">
+              <a14:hiddenFill xmlns:a14="http://schemas.microsoft.com/office/drawing/2010/main">
+                <a:solidFill>
+                  <a:srgbClr val="FFFFFF"/>
+                </a:solidFill>
+              </a14:hiddenFill>
+            </a:ext>
+          </a:extLst>
+        </p:spPr>
+      </p:pic>
+      <p:pic>
+        <p:nvPicPr>
+          <p:cNvPr id="1032" name="Gráfico 1031" descr="Agregar con relleno sólido">
+            <a:extLst>
+              <a:ext uri="{FF2B5EF4-FFF2-40B4-BE49-F238E27FC236}">
+                <a16:creationId xmlns:a16="http://schemas.microsoft.com/office/drawing/2014/main" id="{9CB657C5-B2D0-9725-FA17-05B9DF04F967}"/>
+              </a:ext>
+            </a:extLst>
+          </p:cNvPr>
+          <p:cNvPicPr>
+            <a:picLocks noChangeAspect="1"/>
+          </p:cNvPicPr>
+          <p:nvPr/>
+        </p:nvPicPr>
+        <p:blipFill>
+          <a:blip r:embed="rId17">
+            <a:extLst>
+              <a:ext uri="{96DAC541-7B7A-43D3-8B79-37D633B846F1}">
+                <asvg:svgBlip xmlns:asvg="http://schemas.microsoft.com/office/drawing/2016/SVG/main" r:embed="rId18"/>
+              </a:ext>
+            </a:extLst>
+          </a:blip>
+          <a:stretch>
+            <a:fillRect/>
+          </a:stretch>
+        </p:blipFill>
+        <p:spPr>
+          <a:xfrm>
+            <a:off x="5892115" y="4110987"/>
+            <a:ext cx="224672" cy="224672"/>
+          </a:xfrm>
+          <a:prstGeom prst="rect">
+            <a:avLst/>
+          </a:prstGeom>
+        </p:spPr>
+      </p:pic>
+      <p:sp>
+        <p:nvSpPr>
+          <p:cNvPr id="1034" name="Rectángulo: esquinas redondeadas 1033">
+            <a:extLst>
+              <a:ext uri="{FF2B5EF4-FFF2-40B4-BE49-F238E27FC236}">
+                <a16:creationId xmlns:a16="http://schemas.microsoft.com/office/drawing/2014/main" id="{CD56FC6C-8F2C-D232-EFFD-D7DA42D1DA08}"/>
+              </a:ext>
+            </a:extLst>
+          </p:cNvPr>
+          <p:cNvSpPr/>
+          <p:nvPr/>
+        </p:nvSpPr>
+        <p:spPr>
+          <a:xfrm>
+            <a:off x="9466661" y="1975133"/>
+            <a:ext cx="2100573" cy="3637052"/>
+          </a:xfrm>
+          <a:prstGeom prst="roundRect">
+            <a:avLst/>
+          </a:prstGeom>
+          <a:solidFill>
+            <a:schemeClr val="bg1">
+              <a:lumMod val="85000"/>
+            </a:schemeClr>
+          </a:solidFill>
+          <a:ln>
+            <a:solidFill>
+              <a:schemeClr val="bg1">
+                <a:lumMod val="85000"/>
+              </a:schemeClr>
+            </a:solidFill>
+          </a:ln>
+        </p:spPr>
+        <p:style>
+          <a:lnRef idx="2">
+            <a:schemeClr val="accent1">
+              <a:shade val="15000"/>
+            </a:schemeClr>
+          </a:lnRef>
+          <a:fillRef idx="1">
+            <a:schemeClr val="accent1"/>
+          </a:fillRef>
+          <a:effectRef idx="0">
+            <a:schemeClr val="accent1"/>
+          </a:effectRef>
+          <a:fontRef idx="minor">
+            <a:schemeClr val="lt1"/>
+          </a:fontRef>
+        </p:style>
+        <p:txBody>
+          <a:bodyPr rtlCol="0" anchor="ctr"/>
+          <a:lstStyle/>
+          <a:p>
+            <a:pPr algn="ctr"/>
+            <a:endParaRPr lang="ca-ES" noProof="0" dirty="0"/>
+          </a:p>
+        </p:txBody>
+      </p:sp>
+      <p:sp>
+        <p:nvSpPr>
+          <p:cNvPr id="45" name="CuadroTexto 44">
+            <a:extLst>
+              <a:ext uri="{FF2B5EF4-FFF2-40B4-BE49-F238E27FC236}">
+                <a16:creationId xmlns:a16="http://schemas.microsoft.com/office/drawing/2014/main" id="{97173A74-37D0-C0E9-897D-D85BDBF9ABBF}"/>
+              </a:ext>
+            </a:extLst>
+          </p:cNvPr>
+          <p:cNvSpPr txBox="1"/>
+          <p:nvPr/>
+        </p:nvSpPr>
+        <p:spPr>
+          <a:xfrm>
+            <a:off x="9649450" y="2172574"/>
+            <a:ext cx="1645200" cy="261610"/>
+          </a:xfrm>
+          <a:prstGeom prst="rect">
+            <a:avLst/>
+          </a:prstGeom>
+          <a:noFill/>
+          <a:ln>
+            <a:noFill/>
+          </a:ln>
+        </p:spPr>
+        <p:txBody>
+          <a:bodyPr wrap="square" rtlCol="0">
+            <a:spAutoFit/>
+          </a:bodyPr>
+          <a:lstStyle/>
+          <a:p>
+            <a:pPr algn="ctr"/>
+            <a:r>
+              <a:rPr lang="ca-ES" sz="1100" b="1" dirty="0">
+                <a:latin typeface="+mj-lt"/>
+              </a:rPr>
+              <a:t>Visualization</a:t>
+            </a:r>
+            <a:endParaRPr lang="ca-ES" sz="1100" noProof="0" dirty="0">
+              <a:latin typeface="+mj-lt"/>
+            </a:endParaRPr>
+          </a:p>
+        </p:txBody>
+      </p:sp>
+      <p:pic>
+        <p:nvPicPr>
+          <p:cNvPr id="1033" name="Picture 8" descr="Streamlit • A faster way to build and share data apps">
+            <a:extLst>
+              <a:ext uri="{FF2B5EF4-FFF2-40B4-BE49-F238E27FC236}">
+                <a16:creationId xmlns:a16="http://schemas.microsoft.com/office/drawing/2014/main" id="{7D6812E1-D568-5EF8-1155-2BD0882E4EF3}"/>
+              </a:ext>
+            </a:extLst>
+          </p:cNvPr>
+          <p:cNvPicPr>
+            <a:picLocks noChangeAspect="1" noChangeArrowheads="1"/>
+          </p:cNvPicPr>
+          <p:nvPr/>
+        </p:nvPicPr>
+        <p:blipFill>
+          <a:blip r:embed="rId19">
+            <a:extLst>
+              <a:ext uri="{28A0092B-C50C-407E-A947-70E740481C1C}">
+                <a14:useLocalDpi xmlns:a14="http://schemas.microsoft.com/office/drawing/2010/main" val="0"/>
+              </a:ext>
+            </a:extLst>
+          </a:blip>
+          <a:srcRect/>
+          <a:stretch>
+            <a:fillRect/>
+          </a:stretch>
+        </p:blipFill>
+        <p:spPr bwMode="auto">
+          <a:xfrm>
+            <a:off x="9917746" y="3286445"/>
+            <a:ext cx="1108609" cy="648591"/>
+          </a:xfrm>
+          <a:prstGeom prst="rect">
+            <a:avLst/>
+          </a:prstGeom>
+          <a:noFill/>
+          <a:extLst>
+            <a:ext uri="{909E8E84-426E-40DD-AFC4-6F175D3DCCD1}">
+              <a14:hiddenFill xmlns:a14="http://schemas.microsoft.com/office/drawing/2010/main">
+                <a:solidFill>
+                  <a:srgbClr val="FFFFFF"/>
+                </a:solidFill>
+              </a14:hiddenFill>
+            </a:ext>
+          </a:extLst>
+        </p:spPr>
+      </p:pic>
+      <p:sp>
+        <p:nvSpPr>
+          <p:cNvPr id="1037" name="Rectángulo: esquinas redondeadas 1036">
+            <a:extLst>
+              <a:ext uri="{FF2B5EF4-FFF2-40B4-BE49-F238E27FC236}">
+                <a16:creationId xmlns:a16="http://schemas.microsoft.com/office/drawing/2014/main" id="{756EEF8B-2E41-8192-2B3A-64189CE37B75}"/>
+              </a:ext>
+            </a:extLst>
+          </p:cNvPr>
+          <p:cNvSpPr/>
+          <p:nvPr/>
+        </p:nvSpPr>
+        <p:spPr>
+          <a:xfrm>
+            <a:off x="7182889" y="1975133"/>
+            <a:ext cx="2100573" cy="3714459"/>
+          </a:xfrm>
+          <a:prstGeom prst="roundRect">
+            <a:avLst/>
+          </a:prstGeom>
+          <a:solidFill>
+            <a:schemeClr val="bg1">
+              <a:lumMod val="85000"/>
+            </a:schemeClr>
+          </a:solidFill>
+          <a:ln>
+            <a:solidFill>
+              <a:schemeClr val="bg1">
+                <a:lumMod val="85000"/>
+              </a:schemeClr>
+            </a:solidFill>
+          </a:ln>
+        </p:spPr>
+        <p:style>
+          <a:lnRef idx="2">
+            <a:schemeClr val="accent1">
+              <a:shade val="15000"/>
+            </a:schemeClr>
+          </a:lnRef>
+          <a:fillRef idx="1">
+            <a:schemeClr val="accent1"/>
+          </a:fillRef>
+          <a:effectRef idx="0">
+            <a:schemeClr val="accent1"/>
+          </a:effectRef>
+          <a:fontRef idx="minor">
+            <a:schemeClr val="lt1"/>
+          </a:fontRef>
+        </p:style>
+        <p:txBody>
+          <a:bodyPr rtlCol="0" anchor="ctr"/>
+          <a:lstStyle/>
+          <a:p>
+            <a:pPr algn="ctr"/>
+            <a:endParaRPr lang="ca-ES" noProof="0" dirty="0"/>
+          </a:p>
+        </p:txBody>
+      </p:sp>
+      <p:sp>
+        <p:nvSpPr>
+          <p:cNvPr id="43" name="CuadroTexto 42">
+            <a:extLst>
+              <a:ext uri="{FF2B5EF4-FFF2-40B4-BE49-F238E27FC236}">
+                <a16:creationId xmlns:a16="http://schemas.microsoft.com/office/drawing/2014/main" id="{7D50B884-A634-AB48-7EAB-92048514983E}"/>
+              </a:ext>
+            </a:extLst>
+          </p:cNvPr>
+          <p:cNvSpPr txBox="1"/>
+          <p:nvPr/>
+        </p:nvSpPr>
+        <p:spPr>
+          <a:xfrm>
+            <a:off x="7440630" y="2134102"/>
+            <a:ext cx="1645200" cy="600164"/>
+          </a:xfrm>
+          <a:prstGeom prst="rect">
+            <a:avLst/>
+          </a:prstGeom>
+          <a:noFill/>
+          <a:ln>
+            <a:noFill/>
+          </a:ln>
+        </p:spPr>
+        <p:txBody>
+          <a:bodyPr wrap="square" rtlCol="0">
+            <a:spAutoFit/>
+          </a:bodyPr>
+          <a:lstStyle/>
+          <a:p>
+            <a:pPr algn="ctr"/>
+            <a:r>
+              <a:rPr lang="ca-ES" sz="1100" b="1" dirty="0">
+                <a:latin typeface="+mj-lt"/>
+              </a:rPr>
+              <a:t>CPI </a:t>
+            </a:r>
+            <a:r>
+              <a:rPr lang="ca-ES" sz="1100" b="1" dirty="0" err="1">
+                <a:latin typeface="+mj-lt"/>
+              </a:rPr>
+              <a:t>Calculation</a:t>
+            </a:r>
+            <a:r>
+              <a:rPr lang="ca-ES" sz="1100" b="1" dirty="0">
+                <a:latin typeface="+mj-lt"/>
+              </a:rPr>
+              <a:t> </a:t>
+            </a:r>
+            <a:r>
+              <a:rPr lang="ca-ES" sz="1100" dirty="0">
+                <a:latin typeface="+mj-lt"/>
+              </a:rPr>
+              <a:t>(</a:t>
+            </a:r>
+            <a:r>
+              <a:rPr lang="ca-ES" sz="1100" dirty="0" err="1">
+                <a:latin typeface="+mj-lt"/>
+              </a:rPr>
+              <a:t>Inflation</a:t>
+            </a:r>
+            <a:r>
+              <a:rPr lang="ca-ES" sz="1100" dirty="0">
+                <a:latin typeface="+mj-lt"/>
+              </a:rPr>
+              <a:t> </a:t>
+            </a:r>
+            <a:r>
+              <a:rPr lang="ca-ES" sz="1100" dirty="0" err="1">
+                <a:latin typeface="+mj-lt"/>
+              </a:rPr>
+              <a:t>calculation</a:t>
+            </a:r>
+            <a:r>
+              <a:rPr lang="ca-ES" sz="1100" dirty="0">
+                <a:latin typeface="+mj-lt"/>
+              </a:rPr>
+              <a:t>) </a:t>
+            </a:r>
+            <a:endParaRPr lang="ca-ES" sz="1100" noProof="0" dirty="0">
+              <a:latin typeface="+mj-lt"/>
+            </a:endParaRPr>
+          </a:p>
+        </p:txBody>
+      </p:sp>
+      <p:pic>
+        <p:nvPicPr>
+          <p:cNvPr id="1038" name="Picture 10" descr="Github.io | Argo CD | Opsera Ecosystem">
+            <a:extLst>
+              <a:ext uri="{FF2B5EF4-FFF2-40B4-BE49-F238E27FC236}">
+                <a16:creationId xmlns:a16="http://schemas.microsoft.com/office/drawing/2014/main" id="{BEBB9063-6CEB-5CD7-664C-C98A007114FE}"/>
+              </a:ext>
+            </a:extLst>
+          </p:cNvPr>
+          <p:cNvPicPr>
+            <a:picLocks noChangeAspect="1" noChangeArrowheads="1"/>
+          </p:cNvPicPr>
+          <p:nvPr/>
+        </p:nvPicPr>
+        <p:blipFill>
+          <a:blip r:embed="rId20">
+            <a:extLst>
+              <a:ext uri="{28A0092B-C50C-407E-A947-70E740481C1C}">
+                <a14:useLocalDpi xmlns:a14="http://schemas.microsoft.com/office/drawing/2010/main" val="0"/>
+              </a:ext>
+            </a:extLst>
+          </a:blip>
+          <a:srcRect/>
+          <a:stretch>
+            <a:fillRect/>
+          </a:stretch>
+        </p:blipFill>
+        <p:spPr bwMode="auto">
+          <a:xfrm>
+            <a:off x="10221707" y="5965888"/>
+            <a:ext cx="500685" cy="500685"/>
+          </a:xfrm>
+          <a:prstGeom prst="rect">
+            <a:avLst/>
+          </a:prstGeom>
+          <a:noFill/>
+          <a:extLst>
+            <a:ext uri="{909E8E84-426E-40DD-AFC4-6F175D3DCCD1}">
+              <a14:hiddenFill xmlns:a14="http://schemas.microsoft.com/office/drawing/2010/main">
+                <a:solidFill>
+                  <a:srgbClr val="FFFFFF"/>
+                </a:solidFill>
+              </a14:hiddenFill>
+            </a:ext>
+          </a:extLst>
+        </p:spPr>
+      </p:pic>
+      <p:pic>
+        <p:nvPicPr>
+          <p:cNvPr id="1039" name="Picture 12" descr="Background Reading on GitOps. On the surface, GitOps sounds like a… | by  Tyler Jewell | Medium">
+            <a:extLst>
+              <a:ext uri="{FF2B5EF4-FFF2-40B4-BE49-F238E27FC236}">
+                <a16:creationId xmlns:a16="http://schemas.microsoft.com/office/drawing/2014/main" id="{41E9B856-3850-6B99-57E0-107F66B772FD}"/>
+              </a:ext>
+            </a:extLst>
+          </p:cNvPr>
+          <p:cNvPicPr>
+            <a:picLocks noChangeAspect="1" noChangeArrowheads="1"/>
+          </p:cNvPicPr>
+          <p:nvPr/>
+        </p:nvPicPr>
+        <p:blipFill>
+          <a:blip r:embed="rId21">
+            <a:extLst>
+              <a:ext uri="{28A0092B-C50C-407E-A947-70E740481C1C}">
+                <a14:useLocalDpi xmlns:a14="http://schemas.microsoft.com/office/drawing/2010/main" val="0"/>
+              </a:ext>
+            </a:extLst>
+          </a:blip>
+          <a:srcRect/>
+          <a:stretch>
+            <a:fillRect/>
+          </a:stretch>
+        </p:blipFill>
+        <p:spPr bwMode="auto">
+          <a:xfrm>
+            <a:off x="10722392" y="6030707"/>
+            <a:ext cx="800100" cy="420052"/>
+          </a:xfrm>
+          <a:prstGeom prst="rect">
+            <a:avLst/>
+          </a:prstGeom>
+          <a:noFill/>
+          <a:extLst>
+            <a:ext uri="{909E8E84-426E-40DD-AFC4-6F175D3DCCD1}">
+              <a14:hiddenFill xmlns:a14="http://schemas.microsoft.com/office/drawing/2010/main">
+                <a:solidFill>
+                  <a:srgbClr val="FFFFFF"/>
+                </a:solidFill>
+              </a14:hiddenFill>
+            </a:ext>
+          </a:extLst>
+        </p:spPr>
+      </p:pic>
+      <p:sp>
+        <p:nvSpPr>
+          <p:cNvPr id="1042" name="AutoShape 16">
+            <a:extLst>
+              <a:ext uri="{FF2B5EF4-FFF2-40B4-BE49-F238E27FC236}">
+                <a16:creationId xmlns:a16="http://schemas.microsoft.com/office/drawing/2014/main" id="{6F2EB38A-4E10-07B5-3862-382EA1ACB48C}"/>
+              </a:ext>
+            </a:extLst>
+          </p:cNvPr>
+          <p:cNvSpPr>
+            <a:spLocks noChangeAspect="1" noChangeArrowheads="1"/>
+          </p:cNvSpPr>
+          <p:nvPr/>
+        </p:nvSpPr>
+        <p:spPr bwMode="auto">
+          <a:xfrm>
+            <a:off x="5943600" y="3276600"/>
+            <a:ext cx="304800" cy="304800"/>
+          </a:xfrm>
+          <a:prstGeom prst="rect">
+            <a:avLst/>
+          </a:prstGeom>
+          <a:noFill/>
+          <a:extLst>
+            <a:ext uri="{909E8E84-426E-40DD-AFC4-6F175D3DCCD1}">
+              <a14:hiddenFill xmlns:a14="http://schemas.microsoft.com/office/drawing/2010/main">
+                <a:solidFill>
+                  <a:srgbClr val="FFFFFF"/>
+                </a:solidFill>
+              </a14:hiddenFill>
+            </a:ext>
+          </a:extLst>
+        </p:spPr>
+        <p:txBody>
+          <a:bodyPr vert="horz" wrap="square" lIns="91440" tIns="45720" rIns="91440" bIns="45720" numCol="1" anchor="t" anchorCtr="0" compatLnSpc="1">
+            <a:prstTxWarp prst="textNoShape">
+              <a:avLst/>
+            </a:prstTxWarp>
+          </a:bodyPr>
+          <a:lstStyle/>
+          <a:p>
+            <a:endParaRPr lang="ca-ES"/>
+          </a:p>
+        </p:txBody>
+      </p:sp>
+      <p:pic>
+        <p:nvPicPr>
+          <p:cNvPr id="1044" name="Picture 20">
+            <a:extLst>
+              <a:ext uri="{FF2B5EF4-FFF2-40B4-BE49-F238E27FC236}">
+                <a16:creationId xmlns:a16="http://schemas.microsoft.com/office/drawing/2014/main" id="{23BE90B9-D28C-F866-825F-F9298E05FA9D}"/>
+              </a:ext>
+            </a:extLst>
+          </p:cNvPr>
+          <p:cNvPicPr>
+            <a:picLocks noChangeAspect="1" noChangeArrowheads="1"/>
+          </p:cNvPicPr>
+          <p:nvPr/>
+        </p:nvPicPr>
+        <p:blipFill>
+          <a:blip r:embed="rId22">
+            <a:extLst>
+              <a:ext uri="{28A0092B-C50C-407E-A947-70E740481C1C}">
+                <a14:useLocalDpi xmlns:a14="http://schemas.microsoft.com/office/drawing/2010/main" val="0"/>
+              </a:ext>
+            </a:extLst>
+          </a:blip>
+          <a:srcRect/>
+          <a:stretch>
+            <a:fillRect/>
+          </a:stretch>
+        </p:blipFill>
+        <p:spPr bwMode="auto">
+          <a:xfrm>
+            <a:off x="7573328" y="3249967"/>
+            <a:ext cx="1328549" cy="393375"/>
+          </a:xfrm>
+          <a:prstGeom prst="rect">
+            <a:avLst/>
+          </a:prstGeom>
+          <a:noFill/>
+          <a:extLst>
+            <a:ext uri="{909E8E84-426E-40DD-AFC4-6F175D3DCCD1}">
+              <a14:hiddenFill xmlns:a14="http://schemas.microsoft.com/office/drawing/2010/main">
+                <a:solidFill>
+                  <a:srgbClr val="FFFFFF"/>
+                </a:solidFill>
+              </a14:hiddenFill>
+            </a:ext>
+          </a:extLst>
+        </p:spPr>
+      </p:pic>
+      <p:sp>
+        <p:nvSpPr>
+          <p:cNvPr id="1045" name="AutoShape 22" descr="NumPy Logo PNG Vector (SVG) Free Download">
+            <a:extLst>
+              <a:ext uri="{FF2B5EF4-FFF2-40B4-BE49-F238E27FC236}">
+                <a16:creationId xmlns:a16="http://schemas.microsoft.com/office/drawing/2014/main" id="{E2B91271-D860-EFD0-EE1E-E5E3FF32ABBE}"/>
+              </a:ext>
+            </a:extLst>
+          </p:cNvPr>
+          <p:cNvSpPr>
+            <a:spLocks noChangeAspect="1" noChangeArrowheads="1"/>
+          </p:cNvSpPr>
+          <p:nvPr/>
+        </p:nvSpPr>
+        <p:spPr bwMode="auto">
+          <a:xfrm>
+            <a:off x="6096000" y="3429000"/>
+            <a:ext cx="304800" cy="304800"/>
+          </a:xfrm>
+          <a:prstGeom prst="rect">
+            <a:avLst/>
+          </a:prstGeom>
+          <a:noFill/>
+          <a:extLst>
+            <a:ext uri="{909E8E84-426E-40DD-AFC4-6F175D3DCCD1}">
+              <a14:hiddenFill xmlns:a14="http://schemas.microsoft.com/office/drawing/2010/main">
+                <a:solidFill>
+                  <a:srgbClr val="FFFFFF"/>
+                </a:solidFill>
+              </a14:hiddenFill>
+            </a:ext>
+          </a:extLst>
+        </p:spPr>
+        <p:txBody>
+          <a:bodyPr vert="horz" wrap="square" lIns="91440" tIns="45720" rIns="91440" bIns="45720" numCol="1" anchor="t" anchorCtr="0" compatLnSpc="1">
+            <a:prstTxWarp prst="textNoShape">
+              <a:avLst/>
+            </a:prstTxWarp>
+          </a:bodyPr>
+          <a:lstStyle/>
+          <a:p>
+            <a:endParaRPr lang="ca-ES"/>
+          </a:p>
+        </p:txBody>
+      </p:sp>
+      <p:pic>
+        <p:nvPicPr>
+          <p:cNvPr id="1048" name="Picture 24" descr="Numpy Introduction - Studyopedia">
+            <a:extLst>
+              <a:ext uri="{FF2B5EF4-FFF2-40B4-BE49-F238E27FC236}">
+                <a16:creationId xmlns:a16="http://schemas.microsoft.com/office/drawing/2014/main" id="{7A794CB8-2EE8-0EE6-1D05-9ED552EF6392}"/>
+              </a:ext>
+            </a:extLst>
+          </p:cNvPr>
+          <p:cNvPicPr>
+            <a:picLocks noChangeAspect="1" noChangeArrowheads="1"/>
+          </p:cNvPicPr>
+          <p:nvPr/>
+        </p:nvPicPr>
+        <p:blipFill>
+          <a:blip r:embed="rId23">
+            <a:extLst>
+              <a:ext uri="{28A0092B-C50C-407E-A947-70E740481C1C}">
+                <a14:useLocalDpi xmlns:a14="http://schemas.microsoft.com/office/drawing/2010/main" val="0"/>
+              </a:ext>
+            </a:extLst>
+          </a:blip>
+          <a:srcRect/>
+          <a:stretch>
+            <a:fillRect/>
+          </a:stretch>
+        </p:blipFill>
+        <p:spPr bwMode="auto">
+          <a:xfrm>
+            <a:off x="7922750" y="3659910"/>
+            <a:ext cx="620850" cy="620850"/>
+          </a:xfrm>
+          <a:prstGeom prst="rect">
+            <a:avLst/>
+          </a:prstGeom>
+          <a:noFill/>
+          <a:extLst>
+            <a:ext uri="{909E8E84-426E-40DD-AFC4-6F175D3DCCD1}">
+              <a14:hiddenFill xmlns:a14="http://schemas.microsoft.com/office/drawing/2010/main">
+                <a:solidFill>
+                  <a:srgbClr val="FFFFFF"/>
+                </a:solidFill>
+              </a14:hiddenFill>
+            </a:ext>
+          </a:extLst>
+        </p:spPr>
+      </p:pic>
+      <p:pic>
+        <p:nvPicPr>
+          <p:cNvPr id="1052" name="Picture 28">
+            <a:extLst>
+              <a:ext uri="{FF2B5EF4-FFF2-40B4-BE49-F238E27FC236}">
+                <a16:creationId xmlns:a16="http://schemas.microsoft.com/office/drawing/2014/main" id="{E373A15A-D093-EEFA-750D-A7F0E2DA8D54}"/>
+              </a:ext>
+            </a:extLst>
+          </p:cNvPr>
+          <p:cNvPicPr>
+            <a:picLocks noChangeAspect="1" noChangeArrowheads="1"/>
+          </p:cNvPicPr>
+          <p:nvPr/>
+        </p:nvPicPr>
+        <p:blipFill>
+          <a:blip r:embed="rId24">
+            <a:extLst>
+              <a:ext uri="{28A0092B-C50C-407E-A947-70E740481C1C}">
+                <a14:useLocalDpi xmlns:a14="http://schemas.microsoft.com/office/drawing/2010/main" val="0"/>
+              </a:ext>
+            </a:extLst>
+          </a:blip>
+          <a:srcRect/>
+          <a:stretch>
+            <a:fillRect/>
+          </a:stretch>
+        </p:blipFill>
+        <p:spPr bwMode="auto">
+          <a:xfrm>
+            <a:off x="1611793" y="1384378"/>
+            <a:ext cx="1018490" cy="180026"/>
+          </a:xfrm>
+          <a:prstGeom prst="rect">
+            <a:avLst/>
+          </a:prstGeom>
+          <a:noFill/>
+          <a:extLst>
+            <a:ext uri="{909E8E84-426E-40DD-AFC4-6F175D3DCCD1}">
+              <a14:hiddenFill xmlns:a14="http://schemas.microsoft.com/office/drawing/2010/main">
+                <a:solidFill>
+                  <a:srgbClr val="FFFFFF"/>
+                </a:solidFill>
+              </a14:hiddenFill>
+            </a:ext>
+          </a:extLst>
+        </p:spPr>
+      </p:pic>
+      <p:pic>
+        <p:nvPicPr>
+          <p:cNvPr id="1049" name="Gráfico 1048" descr="Agregar con relleno sólido">
+            <a:extLst>
+              <a:ext uri="{FF2B5EF4-FFF2-40B4-BE49-F238E27FC236}">
+                <a16:creationId xmlns:a16="http://schemas.microsoft.com/office/drawing/2014/main" id="{58B7C8D8-DE82-F0A3-5AA8-1BA014852258}"/>
+              </a:ext>
+            </a:extLst>
+          </p:cNvPr>
+          <p:cNvPicPr>
+            <a:picLocks noChangeAspect="1"/>
+          </p:cNvPicPr>
+          <p:nvPr/>
+        </p:nvPicPr>
+        <p:blipFill>
+          <a:blip r:embed="rId17">
+            <a:extLst>
+              <a:ext uri="{96DAC541-7B7A-43D3-8B79-37D633B846F1}">
+                <asvg:svgBlip xmlns:asvg="http://schemas.microsoft.com/office/drawing/2016/SVG/main" r:embed="rId18"/>
+              </a:ext>
+            </a:extLst>
+          </a:blip>
+          <a:stretch>
+            <a:fillRect/>
+          </a:stretch>
+        </p:blipFill>
+        <p:spPr>
+          <a:xfrm>
+            <a:off x="1390567" y="1410263"/>
+            <a:ext cx="146528" cy="146528"/>
+          </a:xfrm>
+          <a:prstGeom prst="rect">
+            <a:avLst/>
+          </a:prstGeom>
+        </p:spPr>
+      </p:pic>
+      <p:pic>
+        <p:nvPicPr>
+          <p:cNvPr id="1055" name="Gráfico 1054" descr="Flecha derecha con relleno sólido">
+            <a:extLst>
+              <a:ext uri="{FF2B5EF4-FFF2-40B4-BE49-F238E27FC236}">
+                <a16:creationId xmlns:a16="http://schemas.microsoft.com/office/drawing/2014/main" id="{40134753-FEFF-1BF1-21E4-C62FE112EB2A}"/>
+              </a:ext>
+            </a:extLst>
+          </p:cNvPr>
+          <p:cNvPicPr>
+            <a:picLocks noChangeAspect="1"/>
+          </p:cNvPicPr>
+          <p:nvPr/>
+        </p:nvPicPr>
+        <p:blipFill>
+          <a:blip r:embed="rId25">
+            <a:extLst>
+              <a:ext uri="{96DAC541-7B7A-43D3-8B79-37D633B846F1}">
+                <asvg:svgBlip xmlns:asvg="http://schemas.microsoft.com/office/drawing/2016/SVG/main" r:embed="rId26"/>
+              </a:ext>
+            </a:extLst>
+          </a:blip>
+          <a:stretch>
+            <a:fillRect/>
+          </a:stretch>
+        </p:blipFill>
+        <p:spPr>
+          <a:xfrm>
+            <a:off x="2291020" y="2602906"/>
+            <a:ext cx="450136" cy="450136"/>
+          </a:xfrm>
+          <a:prstGeom prst="rect">
+            <a:avLst/>
+          </a:prstGeom>
+        </p:spPr>
+      </p:pic>
+      <p:pic>
+        <p:nvPicPr>
+          <p:cNvPr id="1056" name="Gráfico 1055" descr="Flecha derecha con relleno sólido">
+            <a:extLst>
+              <a:ext uri="{FF2B5EF4-FFF2-40B4-BE49-F238E27FC236}">
+                <a16:creationId xmlns:a16="http://schemas.microsoft.com/office/drawing/2014/main" id="{2185C5A0-44DF-E289-D94C-45281E403805}"/>
+              </a:ext>
+            </a:extLst>
+          </p:cNvPr>
+          <p:cNvPicPr>
+            <a:picLocks noChangeAspect="1"/>
+          </p:cNvPicPr>
+          <p:nvPr/>
+        </p:nvPicPr>
+        <p:blipFill>
+          <a:blip r:embed="rId25">
+            <a:extLst>
+              <a:ext uri="{96DAC541-7B7A-43D3-8B79-37D633B846F1}">
+                <asvg:svgBlip xmlns:asvg="http://schemas.microsoft.com/office/drawing/2016/SVG/main" r:embed="rId26"/>
+              </a:ext>
+            </a:extLst>
+          </a:blip>
+          <a:stretch>
+            <a:fillRect/>
+          </a:stretch>
+        </p:blipFill>
+        <p:spPr>
+          <a:xfrm rot="5400000">
+            <a:off x="3458733" y="3477033"/>
+            <a:ext cx="450136" cy="450136"/>
+          </a:xfrm>
+          <a:prstGeom prst="rect">
+            <a:avLst/>
+          </a:prstGeom>
+        </p:spPr>
+      </p:pic>
+      <p:pic>
+        <p:nvPicPr>
+          <p:cNvPr id="1057" name="Gráfico 1056" descr="Flecha derecha con relleno sólido">
+            <a:extLst>
+              <a:ext uri="{FF2B5EF4-FFF2-40B4-BE49-F238E27FC236}">
+                <a16:creationId xmlns:a16="http://schemas.microsoft.com/office/drawing/2014/main" id="{DC79C46A-B61A-5690-9049-2361BB8A8D75}"/>
+              </a:ext>
+            </a:extLst>
+          </p:cNvPr>
+          <p:cNvPicPr>
+            <a:picLocks noChangeAspect="1"/>
+          </p:cNvPicPr>
+          <p:nvPr/>
+        </p:nvPicPr>
+        <p:blipFill>
+          <a:blip r:embed="rId25">
+            <a:extLst>
+              <a:ext uri="{96DAC541-7B7A-43D3-8B79-37D633B846F1}">
+                <asvg:svgBlip xmlns:asvg="http://schemas.microsoft.com/office/drawing/2016/SVG/main" r:embed="rId26"/>
+              </a:ext>
+            </a:extLst>
+          </a:blip>
+          <a:stretch>
+            <a:fillRect/>
+          </a:stretch>
+        </p:blipFill>
+        <p:spPr>
+          <a:xfrm>
+            <a:off x="4576366" y="4769996"/>
+            <a:ext cx="450136" cy="450136"/>
+          </a:xfrm>
+          <a:prstGeom prst="rect">
+            <a:avLst/>
+          </a:prstGeom>
+        </p:spPr>
+      </p:pic>
+      <p:pic>
+        <p:nvPicPr>
+          <p:cNvPr id="1059" name="Gráfico 1058" descr="Flecha derecha con relleno sólido">
+            <a:extLst>
+              <a:ext uri="{FF2B5EF4-FFF2-40B4-BE49-F238E27FC236}">
+                <a16:creationId xmlns:a16="http://schemas.microsoft.com/office/drawing/2014/main" id="{20867257-066E-DFCC-597D-3118A2B6933E}"/>
+              </a:ext>
+            </a:extLst>
+          </p:cNvPr>
+          <p:cNvPicPr>
+            <a:picLocks noChangeAspect="1"/>
+          </p:cNvPicPr>
+          <p:nvPr/>
+        </p:nvPicPr>
+        <p:blipFill>
+          <a:blip r:embed="rId25">
+            <a:extLst>
+              <a:ext uri="{96DAC541-7B7A-43D3-8B79-37D633B846F1}">
+                <asvg:svgBlip xmlns:asvg="http://schemas.microsoft.com/office/drawing/2016/SVG/main" r:embed="rId26"/>
+              </a:ext>
+            </a:extLst>
+          </a:blip>
+          <a:stretch>
+            <a:fillRect/>
+          </a:stretch>
+        </p:blipFill>
+        <p:spPr>
+          <a:xfrm>
+            <a:off x="6877616" y="3588436"/>
+            <a:ext cx="450136" cy="450136"/>
+          </a:xfrm>
+          <a:prstGeom prst="rect">
+            <a:avLst/>
+          </a:prstGeom>
+        </p:spPr>
+      </p:pic>
+      <p:pic>
+        <p:nvPicPr>
+          <p:cNvPr id="1061" name="Gráfico 1060" descr="Flecha derecha con relleno sólido">
+            <a:extLst>
+              <a:ext uri="{FF2B5EF4-FFF2-40B4-BE49-F238E27FC236}">
+                <a16:creationId xmlns:a16="http://schemas.microsoft.com/office/drawing/2014/main" id="{F6DE1E19-6709-E59F-B173-5DF71DB1B3C9}"/>
+              </a:ext>
+            </a:extLst>
+          </p:cNvPr>
+          <p:cNvPicPr>
+            <a:picLocks noChangeAspect="1"/>
+          </p:cNvPicPr>
+          <p:nvPr/>
+        </p:nvPicPr>
+        <p:blipFill>
+          <a:blip r:embed="rId25">
+            <a:extLst>
+              <a:ext uri="{96DAC541-7B7A-43D3-8B79-37D633B846F1}">
+                <asvg:svgBlip xmlns:asvg="http://schemas.microsoft.com/office/drawing/2016/SVG/main" r:embed="rId26"/>
+              </a:ext>
+            </a:extLst>
+          </a:blip>
+          <a:stretch>
+            <a:fillRect/>
+          </a:stretch>
+        </p:blipFill>
+        <p:spPr>
+          <a:xfrm>
+            <a:off x="9158942" y="3568591"/>
+            <a:ext cx="450136" cy="450136"/>
+          </a:xfrm>
+          <a:prstGeom prst="rect">
+            <a:avLst/>
+          </a:prstGeom>
+        </p:spPr>
+      </p:pic>
+    </p:spTree>
+    <p:extLst>
+      <p:ext uri="{BB962C8B-B14F-4D97-AF65-F5344CB8AC3E}">
+        <p14:creationId xmlns:p14="http://schemas.microsoft.com/office/powerpoint/2010/main" val="1195573799"/>
+      </p:ext>
+    </p:extLst>
+  </p:cSld>
+  <p:clrMapOvr>
+    <a:masterClrMapping/>
+  </p:clrMapOvr>
+</p:sld>
+</file>
+
+<file path=ppt/slides/slide7.xml><?xml version="1.0" encoding="utf-8"?>
 <p:sld xmlns:a="http://schemas.openxmlformats.org/drawingml/2006/main" xmlns:r="http://schemas.openxmlformats.org/officeDocument/2006/relationships" xmlns:p="http://schemas.openxmlformats.org/presentationml/2006/main">
   <p:cSld>
     <p:spTree>

</xml_diff>